<commit_message>
updates to unsupervised learning module
</commit_message>
<xml_diff>
--- a/module-3/ppt/3.2-Supervised Learning.pptx
+++ b/module-3/ppt/3.2-Supervised Learning.pptx
@@ -6,7 +6,7 @@
     <p:sldMasterId id="2147483671" r:id="rId2"/>
   </p:sldMasterIdLst>
   <p:notesMasterIdLst>
-    <p:notesMasterId r:id="rId29"/>
+    <p:notesMasterId r:id="rId28"/>
   </p:notesMasterIdLst>
   <p:sldIdLst>
     <p:sldId id="2602" r:id="rId3"/>
@@ -32,9 +32,8 @@
     <p:sldId id="336" r:id="rId23"/>
     <p:sldId id="337" r:id="rId24"/>
     <p:sldId id="643" r:id="rId25"/>
-    <p:sldId id="2620" r:id="rId26"/>
-    <p:sldId id="2619" r:id="rId27"/>
-    <p:sldId id="621" r:id="rId28"/>
+    <p:sldId id="2619" r:id="rId26"/>
+    <p:sldId id="621" r:id="rId27"/>
   </p:sldIdLst>
   <p:sldSz cx="12192000" cy="6858000"/>
   <p:notesSz cx="6858000" cy="9144000"/>
@@ -887,14 +886,14 @@
         <p:spPr>
           <a:extLst>
             <a:ext uri="{909E8E84-426E-40dd-AFC4-6F175D3DCCD1}">
-              <a14:hiddenFill xmlns:a14="http://schemas.microsoft.com/office/drawing/2010/main" xmlns="">
+              <a14:hiddenFill xmlns="" xmlns:a14="http://schemas.microsoft.com/office/drawing/2010/main">
                 <a:solidFill>
                   <a:schemeClr val="accent1"/>
                 </a:solidFill>
               </a14:hiddenFill>
             </a:ext>
             <a:ext uri="{91240B29-F687-4f45-9708-019B960494DF}">
-              <a14:hiddenLine xmlns:a14="http://schemas.microsoft.com/office/drawing/2010/main" xmlns="" w="9525">
+              <a14:hiddenLine xmlns="" xmlns:a14="http://schemas.microsoft.com/office/drawing/2010/main" w="9525">
                 <a:solidFill>
                   <a:schemeClr val="tx1"/>
                 </a:solidFill>
@@ -904,7 +903,7 @@
               </a14:hiddenLine>
             </a:ext>
             <a:ext uri="{AF507438-7753-43e0-B8FC-AC1667EBCBE1}">
-              <a14:hiddenEffects xmlns:a14="http://schemas.microsoft.com/office/drawing/2010/main" xmlns="">
+              <a14:hiddenEffects xmlns="" xmlns:a14="http://schemas.microsoft.com/office/drawing/2010/main">
                 <a:effectLst>
                   <a:outerShdw blurRad="63500" dist="38099" dir="2700000" algn="ctr" rotWithShape="0">
                     <a:schemeClr val="bg2">
@@ -915,7 +914,7 @@
               </a14:hiddenEffects>
             </a:ext>
             <a:ext uri="{FAA26D3D-D897-4be2-8F04-BA451C77F1D7}">
-              <ma14:placeholderFlag xmlns:ma14="http://schemas.microsoft.com/office/mac/drawingml/2011/main" xmlns="" val="1"/>
+              <ma14:placeholderFlag xmlns="" xmlns:ma14="http://schemas.microsoft.com/office/mac/drawingml/2011/main" val="1"/>
             </a:ext>
           </a:extLst>
         </p:spPr>
@@ -1059,7 +1058,7 @@
           <a:ln/>
           <a:extLst>
             <a:ext uri="{FAA26D3D-D897-4be2-8F04-BA451C77F1D7}">
-              <ma14:placeholderFlag xmlns:ma14="http://schemas.microsoft.com/office/mac/drawingml/2011/main" xmlns="" val="1"/>
+              <ma14:placeholderFlag xmlns="" xmlns:ma14="http://schemas.microsoft.com/office/mac/drawingml/2011/main" val="1"/>
             </a:ext>
           </a:extLst>
         </p:spPr>
@@ -1143,14 +1142,14 @@
         <p:spPr>
           <a:extLst>
             <a:ext uri="{909E8E84-426E-40dd-AFC4-6F175D3DCCD1}">
-              <a14:hiddenFill xmlns:a14="http://schemas.microsoft.com/office/drawing/2010/main" xmlns="">
+              <a14:hiddenFill xmlns="" xmlns:a14="http://schemas.microsoft.com/office/drawing/2010/main">
                 <a:solidFill>
                   <a:schemeClr val="accent1"/>
                 </a:solidFill>
               </a14:hiddenFill>
             </a:ext>
             <a:ext uri="{91240B29-F687-4f45-9708-019B960494DF}">
-              <a14:hiddenLine xmlns:a14="http://schemas.microsoft.com/office/drawing/2010/main" xmlns="" w="9525">
+              <a14:hiddenLine xmlns="" xmlns:a14="http://schemas.microsoft.com/office/drawing/2010/main" w="9525">
                 <a:solidFill>
                   <a:schemeClr val="tx1"/>
                 </a:solidFill>
@@ -1160,7 +1159,7 @@
               </a14:hiddenLine>
             </a:ext>
             <a:ext uri="{AF507438-7753-43e0-B8FC-AC1667EBCBE1}">
-              <a14:hiddenEffects xmlns:a14="http://schemas.microsoft.com/office/drawing/2010/main" xmlns="">
+              <a14:hiddenEffects xmlns="" xmlns:a14="http://schemas.microsoft.com/office/drawing/2010/main">
                 <a:effectLst>
                   <a:outerShdw blurRad="63500" dist="38099" dir="2700000" algn="ctr" rotWithShape="0">
                     <a:schemeClr val="bg2">
@@ -1171,7 +1170,7 @@
               </a14:hiddenEffects>
             </a:ext>
             <a:ext uri="{FAA26D3D-D897-4be2-8F04-BA451C77F1D7}">
-              <ma14:placeholderFlag xmlns:ma14="http://schemas.microsoft.com/office/mac/drawingml/2011/main" xmlns="" val="1"/>
+              <ma14:placeholderFlag xmlns="" xmlns:ma14="http://schemas.microsoft.com/office/mac/drawingml/2011/main" val="1"/>
             </a:ext>
           </a:extLst>
         </p:spPr>
@@ -1315,7 +1314,7 @@
           <a:ln/>
           <a:extLst>
             <a:ext uri="{FAA26D3D-D897-4be2-8F04-BA451C77F1D7}">
-              <ma14:placeholderFlag xmlns:ma14="http://schemas.microsoft.com/office/mac/drawingml/2011/main" xmlns="" val="1"/>
+              <ma14:placeholderFlag xmlns="" xmlns:ma14="http://schemas.microsoft.com/office/mac/drawingml/2011/main" val="1"/>
             </a:ext>
           </a:extLst>
         </p:spPr>
@@ -1407,14 +1406,14 @@
         <p:spPr>
           <a:extLst>
             <a:ext uri="{909E8E84-426E-40dd-AFC4-6F175D3DCCD1}">
-              <a14:hiddenFill xmlns:a14="http://schemas.microsoft.com/office/drawing/2010/main" xmlns="">
+              <a14:hiddenFill xmlns="" xmlns:a14="http://schemas.microsoft.com/office/drawing/2010/main">
                 <a:solidFill>
                   <a:schemeClr val="accent1"/>
                 </a:solidFill>
               </a14:hiddenFill>
             </a:ext>
             <a:ext uri="{91240B29-F687-4f45-9708-019B960494DF}">
-              <a14:hiddenLine xmlns:a14="http://schemas.microsoft.com/office/drawing/2010/main" xmlns="" w="9525">
+              <a14:hiddenLine xmlns="" xmlns:a14="http://schemas.microsoft.com/office/drawing/2010/main" w="9525">
                 <a:solidFill>
                   <a:schemeClr val="tx1"/>
                 </a:solidFill>
@@ -1424,7 +1423,7 @@
               </a14:hiddenLine>
             </a:ext>
             <a:ext uri="{AF507438-7753-43e0-B8FC-AC1667EBCBE1}">
-              <a14:hiddenEffects xmlns:a14="http://schemas.microsoft.com/office/drawing/2010/main" xmlns="">
+              <a14:hiddenEffects xmlns="" xmlns:a14="http://schemas.microsoft.com/office/drawing/2010/main">
                 <a:effectLst>
                   <a:outerShdw blurRad="63500" dist="38099" dir="2700000" algn="ctr" rotWithShape="0">
                     <a:schemeClr val="bg2">
@@ -1435,7 +1434,7 @@
               </a14:hiddenEffects>
             </a:ext>
             <a:ext uri="{FAA26D3D-D897-4be2-8F04-BA451C77F1D7}">
-              <ma14:placeholderFlag xmlns:ma14="http://schemas.microsoft.com/office/mac/drawingml/2011/main" xmlns="" val="1"/>
+              <ma14:placeholderFlag xmlns="" xmlns:ma14="http://schemas.microsoft.com/office/mac/drawingml/2011/main" val="1"/>
             </a:ext>
           </a:extLst>
         </p:spPr>
@@ -1586,7 +1585,7 @@
           <a:ln/>
           <a:extLst>
             <a:ext uri="{FAA26D3D-D897-4be2-8F04-BA451C77F1D7}">
-              <ma14:placeholderFlag xmlns:ma14="http://schemas.microsoft.com/office/mac/drawingml/2011/main" xmlns="" val="1"/>
+              <ma14:placeholderFlag xmlns="" xmlns:ma14="http://schemas.microsoft.com/office/mac/drawingml/2011/main" val="1"/>
             </a:ext>
           </a:extLst>
         </p:spPr>
@@ -1782,14 +1781,14 @@
         <p:spPr>
           <a:extLst>
             <a:ext uri="{909E8E84-426E-40dd-AFC4-6F175D3DCCD1}">
-              <a14:hiddenFill xmlns:a14="http://schemas.microsoft.com/office/drawing/2010/main" xmlns="">
+              <a14:hiddenFill xmlns="" xmlns:a14="http://schemas.microsoft.com/office/drawing/2010/main">
                 <a:solidFill>
                   <a:schemeClr val="accent1"/>
                 </a:solidFill>
               </a14:hiddenFill>
             </a:ext>
             <a:ext uri="{91240B29-F687-4f45-9708-019B960494DF}">
-              <a14:hiddenLine xmlns:a14="http://schemas.microsoft.com/office/drawing/2010/main" xmlns="" w="9525">
+              <a14:hiddenLine xmlns="" xmlns:a14="http://schemas.microsoft.com/office/drawing/2010/main" w="9525">
                 <a:solidFill>
                   <a:schemeClr val="tx1"/>
                 </a:solidFill>
@@ -1799,7 +1798,7 @@
               </a14:hiddenLine>
             </a:ext>
             <a:ext uri="{AF507438-7753-43e0-B8FC-AC1667EBCBE1}">
-              <a14:hiddenEffects xmlns:a14="http://schemas.microsoft.com/office/drawing/2010/main" xmlns="">
+              <a14:hiddenEffects xmlns="" xmlns:a14="http://schemas.microsoft.com/office/drawing/2010/main">
                 <a:effectLst>
                   <a:outerShdw blurRad="63500" dist="38099" dir="2700000" algn="ctr" rotWithShape="0">
                     <a:schemeClr val="bg2">
@@ -1810,7 +1809,7 @@
               </a14:hiddenEffects>
             </a:ext>
             <a:ext uri="{FAA26D3D-D897-4be2-8F04-BA451C77F1D7}">
-              <ma14:placeholderFlag xmlns:ma14="http://schemas.microsoft.com/office/mac/drawingml/2011/main" xmlns="" val="1"/>
+              <ma14:placeholderFlag xmlns="" xmlns:ma14="http://schemas.microsoft.com/office/mac/drawingml/2011/main" val="1"/>
             </a:ext>
           </a:extLst>
         </p:spPr>
@@ -1954,7 +1953,7 @@
           <a:ln/>
           <a:extLst>
             <a:ext uri="{FAA26D3D-D897-4be2-8F04-BA451C77F1D7}">
-              <ma14:placeholderFlag xmlns:ma14="http://schemas.microsoft.com/office/mac/drawingml/2011/main" xmlns="" val="1"/>
+              <ma14:placeholderFlag xmlns="" xmlns:ma14="http://schemas.microsoft.com/office/mac/drawingml/2011/main" val="1"/>
             </a:ext>
           </a:extLst>
         </p:spPr>
@@ -2168,7 +2167,7 @@
           <a:p>
             <a:fld id="{387D656D-43A4-B04C-9493-934C0D43B551}" type="slidenum">
               <a:rPr lang="en-US" smtClean="0"/>
-              <a:t>26</a:t>
+              <a:t>25</a:t>
             </a:fld>
             <a:endParaRPr lang="en-US"/>
           </a:p>
@@ -26461,116 +26460,6 @@
       </p:grpSpPr>
       <p:sp>
         <p:nvSpPr>
-          <p:cNvPr id="6" name="Title 5">
-            <a:extLst>
-              <a:ext uri="{FF2B5EF4-FFF2-40B4-BE49-F238E27FC236}">
-                <a16:creationId xmlns:a16="http://schemas.microsoft.com/office/drawing/2014/main" id="{236094DA-B01F-E94E-B80F-FA72118207B7}"/>
-              </a:ext>
-            </a:extLst>
-          </p:cNvPr>
-          <p:cNvSpPr>
-            <a:spLocks noGrp="1"/>
-          </p:cNvSpPr>
-          <p:nvPr>
-            <p:ph type="title"/>
-          </p:nvPr>
-        </p:nvSpPr>
-        <p:spPr/>
-        <p:txBody>
-          <a:bodyPr/>
-          <a:lstStyle/>
-          <a:p>
-            <a:endParaRPr lang="en-US"/>
-          </a:p>
-        </p:txBody>
-      </p:sp>
-      <p:sp>
-        <p:nvSpPr>
-          <p:cNvPr id="7" name="Content Placeholder 6">
-            <a:extLst>
-              <a:ext uri="{FF2B5EF4-FFF2-40B4-BE49-F238E27FC236}">
-                <a16:creationId xmlns:a16="http://schemas.microsoft.com/office/drawing/2014/main" id="{EA6B2F5B-4448-6749-8B0E-F89F123352D5}"/>
-              </a:ext>
-            </a:extLst>
-          </p:cNvPr>
-          <p:cNvSpPr>
-            <a:spLocks noGrp="1"/>
-          </p:cNvSpPr>
-          <p:nvPr>
-            <p:ph idx="1"/>
-          </p:nvPr>
-        </p:nvSpPr>
-        <p:spPr/>
-        <p:txBody>
-          <a:bodyPr/>
-          <a:lstStyle/>
-          <a:p>
-            <a:endParaRPr lang="en-US"/>
-          </a:p>
-        </p:txBody>
-      </p:sp>
-      <p:sp>
-        <p:nvSpPr>
-          <p:cNvPr id="5" name="Slide Number Placeholder 4">
-            <a:extLst>
-              <a:ext uri="{FF2B5EF4-FFF2-40B4-BE49-F238E27FC236}">
-                <a16:creationId xmlns:a16="http://schemas.microsoft.com/office/drawing/2014/main" id="{125622B2-1959-6743-912A-4DDE8F436696}"/>
-              </a:ext>
-            </a:extLst>
-          </p:cNvPr>
-          <p:cNvSpPr>
-            <a:spLocks noGrp="1"/>
-          </p:cNvSpPr>
-          <p:nvPr>
-            <p:ph type="sldNum" sz="quarter" idx="12"/>
-          </p:nvPr>
-        </p:nvSpPr>
-        <p:spPr/>
-        <p:txBody>
-          <a:bodyPr/>
-          <a:lstStyle/>
-          <a:p>
-            <a:fld id="{256CE055-ECFD-9048-9FD8-7E2D8656A4F7}" type="slidenum">
-              <a:rPr lang="en-US" smtClean="0"/>
-              <a:pPr/>
-              <a:t>24</a:t>
-            </a:fld>
-            <a:endParaRPr lang="en-US" dirty="0"/>
-          </a:p>
-        </p:txBody>
-      </p:sp>
-    </p:spTree>
-    <p:extLst>
-      <p:ext uri="{BB962C8B-B14F-4D97-AF65-F5344CB8AC3E}">
-        <p14:creationId xmlns:p14="http://schemas.microsoft.com/office/powerpoint/2010/main" val="4112048951"/>
-      </p:ext>
-    </p:extLst>
-  </p:cSld>
-  <p:clrMapOvr>
-    <a:masterClrMapping/>
-  </p:clrMapOvr>
-</p:sld>
-</file>
-
-<file path=ppt/slides/slide25.xml><?xml version="1.0" encoding="utf-8"?>
-<p:sld xmlns:a="http://schemas.openxmlformats.org/drawingml/2006/main" xmlns:r="http://schemas.openxmlformats.org/officeDocument/2006/relationships" xmlns:p="http://schemas.openxmlformats.org/presentationml/2006/main">
-  <p:cSld>
-    <p:spTree>
-      <p:nvGrpSpPr>
-        <p:cNvPr id="1" name=""/>
-        <p:cNvGrpSpPr/>
-        <p:nvPr/>
-      </p:nvGrpSpPr>
-      <p:grpSpPr>
-        <a:xfrm>
-          <a:off x="0" y="0"/>
-          <a:ext cx="0" cy="0"/>
-          <a:chOff x="0" y="0"/>
-          <a:chExt cx="0" cy="0"/>
-        </a:xfrm>
-      </p:grpSpPr>
-      <p:sp>
-        <p:nvSpPr>
           <p:cNvPr id="5" name="Title 4">
             <a:extLst>
               <a:ext uri="{FF2B5EF4-FFF2-40B4-BE49-F238E27FC236}">
@@ -26610,7 +26499,7 @@
 </p:sld>
 </file>
 
-<file path=ppt/slides/slide26.xml><?xml version="1.0" encoding="utf-8"?>
+<file path=ppt/slides/slide25.xml><?xml version="1.0" encoding="utf-8"?>
 <p:sld xmlns:a="http://schemas.openxmlformats.org/drawingml/2006/main" xmlns:r="http://schemas.openxmlformats.org/officeDocument/2006/relationships" xmlns:p="http://schemas.openxmlformats.org/presentationml/2006/main">
   <p:cSld>
     <p:spTree>

</xml_diff>

<commit_message>
clustering and naive bayes traffic analysis notebooks
</commit_message>
<xml_diff>
--- a/module-3/ppt/3.2-Supervised Learning.pptx
+++ b/module-3/ppt/3.2-Supervised Learning.pptx
@@ -6,7 +6,7 @@
     <p:sldMasterId id="2147483671" r:id="rId2"/>
   </p:sldMasterIdLst>
   <p:notesMasterIdLst>
-    <p:notesMasterId r:id="rId28"/>
+    <p:notesMasterId r:id="rId29"/>
   </p:notesMasterIdLst>
   <p:sldIdLst>
     <p:sldId id="2602" r:id="rId3"/>
@@ -34,6 +34,7 @@
     <p:sldId id="643" r:id="rId25"/>
     <p:sldId id="2619" r:id="rId26"/>
     <p:sldId id="621" r:id="rId27"/>
+    <p:sldId id="2620" r:id="rId28"/>
   </p:sldIdLst>
   <p:sldSz cx="12192000" cy="6858000"/>
   <p:notesSz cx="6858000" cy="9144000"/>
@@ -222,7 +223,7 @@
           <a:p>
             <a:fld id="{ECC93BED-D6B3-334D-9CE3-F2869B7E72EB}" type="datetimeFigureOut">
               <a:rPr lang="en-US" smtClean="0"/>
-              <a:t>11/30/20</a:t>
+              <a:t>12/7/20</a:t>
             </a:fld>
             <a:endParaRPr lang="en-US"/>
           </a:p>
@@ -886,14 +887,14 @@
         <p:spPr>
           <a:extLst>
             <a:ext uri="{909E8E84-426E-40dd-AFC4-6F175D3DCCD1}">
-              <a14:hiddenFill xmlns="" xmlns:a14="http://schemas.microsoft.com/office/drawing/2010/main">
+              <a14:hiddenFill xmlns:a14="http://schemas.microsoft.com/office/drawing/2010/main" xmlns="">
                 <a:solidFill>
                   <a:schemeClr val="accent1"/>
                 </a:solidFill>
               </a14:hiddenFill>
             </a:ext>
             <a:ext uri="{91240B29-F687-4f45-9708-019B960494DF}">
-              <a14:hiddenLine xmlns="" xmlns:a14="http://schemas.microsoft.com/office/drawing/2010/main" w="9525">
+              <a14:hiddenLine xmlns:a14="http://schemas.microsoft.com/office/drawing/2010/main" xmlns="" w="9525">
                 <a:solidFill>
                   <a:schemeClr val="tx1"/>
                 </a:solidFill>
@@ -903,7 +904,7 @@
               </a14:hiddenLine>
             </a:ext>
             <a:ext uri="{AF507438-7753-43e0-B8FC-AC1667EBCBE1}">
-              <a14:hiddenEffects xmlns="" xmlns:a14="http://schemas.microsoft.com/office/drawing/2010/main">
+              <a14:hiddenEffects xmlns:a14="http://schemas.microsoft.com/office/drawing/2010/main" xmlns="">
                 <a:effectLst>
                   <a:outerShdw blurRad="63500" dist="38099" dir="2700000" algn="ctr" rotWithShape="0">
                     <a:schemeClr val="bg2">
@@ -914,7 +915,7 @@
               </a14:hiddenEffects>
             </a:ext>
             <a:ext uri="{FAA26D3D-D897-4be2-8F04-BA451C77F1D7}">
-              <ma14:placeholderFlag xmlns="" xmlns:ma14="http://schemas.microsoft.com/office/mac/drawingml/2011/main" val="1"/>
+              <ma14:placeholderFlag xmlns:ma14="http://schemas.microsoft.com/office/mac/drawingml/2011/main" xmlns="" val="1"/>
             </a:ext>
           </a:extLst>
         </p:spPr>
@@ -1058,7 +1059,7 @@
           <a:ln/>
           <a:extLst>
             <a:ext uri="{FAA26D3D-D897-4be2-8F04-BA451C77F1D7}">
-              <ma14:placeholderFlag xmlns="" xmlns:ma14="http://schemas.microsoft.com/office/mac/drawingml/2011/main" val="1"/>
+              <ma14:placeholderFlag xmlns:ma14="http://schemas.microsoft.com/office/mac/drawingml/2011/main" xmlns="" val="1"/>
             </a:ext>
           </a:extLst>
         </p:spPr>
@@ -1142,14 +1143,14 @@
         <p:spPr>
           <a:extLst>
             <a:ext uri="{909E8E84-426E-40dd-AFC4-6F175D3DCCD1}">
-              <a14:hiddenFill xmlns="" xmlns:a14="http://schemas.microsoft.com/office/drawing/2010/main">
+              <a14:hiddenFill xmlns:a14="http://schemas.microsoft.com/office/drawing/2010/main" xmlns="">
                 <a:solidFill>
                   <a:schemeClr val="accent1"/>
                 </a:solidFill>
               </a14:hiddenFill>
             </a:ext>
             <a:ext uri="{91240B29-F687-4f45-9708-019B960494DF}">
-              <a14:hiddenLine xmlns="" xmlns:a14="http://schemas.microsoft.com/office/drawing/2010/main" w="9525">
+              <a14:hiddenLine xmlns:a14="http://schemas.microsoft.com/office/drawing/2010/main" xmlns="" w="9525">
                 <a:solidFill>
                   <a:schemeClr val="tx1"/>
                 </a:solidFill>
@@ -1159,7 +1160,7 @@
               </a14:hiddenLine>
             </a:ext>
             <a:ext uri="{AF507438-7753-43e0-B8FC-AC1667EBCBE1}">
-              <a14:hiddenEffects xmlns="" xmlns:a14="http://schemas.microsoft.com/office/drawing/2010/main">
+              <a14:hiddenEffects xmlns:a14="http://schemas.microsoft.com/office/drawing/2010/main" xmlns="">
                 <a:effectLst>
                   <a:outerShdw blurRad="63500" dist="38099" dir="2700000" algn="ctr" rotWithShape="0">
                     <a:schemeClr val="bg2">
@@ -1170,7 +1171,7 @@
               </a14:hiddenEffects>
             </a:ext>
             <a:ext uri="{FAA26D3D-D897-4be2-8F04-BA451C77F1D7}">
-              <ma14:placeholderFlag xmlns="" xmlns:ma14="http://schemas.microsoft.com/office/mac/drawingml/2011/main" val="1"/>
+              <ma14:placeholderFlag xmlns:ma14="http://schemas.microsoft.com/office/mac/drawingml/2011/main" xmlns="" val="1"/>
             </a:ext>
           </a:extLst>
         </p:spPr>
@@ -1314,7 +1315,7 @@
           <a:ln/>
           <a:extLst>
             <a:ext uri="{FAA26D3D-D897-4be2-8F04-BA451C77F1D7}">
-              <ma14:placeholderFlag xmlns="" xmlns:ma14="http://schemas.microsoft.com/office/mac/drawingml/2011/main" val="1"/>
+              <ma14:placeholderFlag xmlns:ma14="http://schemas.microsoft.com/office/mac/drawingml/2011/main" xmlns="" val="1"/>
             </a:ext>
           </a:extLst>
         </p:spPr>
@@ -1406,14 +1407,14 @@
         <p:spPr>
           <a:extLst>
             <a:ext uri="{909E8E84-426E-40dd-AFC4-6F175D3DCCD1}">
-              <a14:hiddenFill xmlns="" xmlns:a14="http://schemas.microsoft.com/office/drawing/2010/main">
+              <a14:hiddenFill xmlns:a14="http://schemas.microsoft.com/office/drawing/2010/main" xmlns="">
                 <a:solidFill>
                   <a:schemeClr val="accent1"/>
                 </a:solidFill>
               </a14:hiddenFill>
             </a:ext>
             <a:ext uri="{91240B29-F687-4f45-9708-019B960494DF}">
-              <a14:hiddenLine xmlns="" xmlns:a14="http://schemas.microsoft.com/office/drawing/2010/main" w="9525">
+              <a14:hiddenLine xmlns:a14="http://schemas.microsoft.com/office/drawing/2010/main" xmlns="" w="9525">
                 <a:solidFill>
                   <a:schemeClr val="tx1"/>
                 </a:solidFill>
@@ -1423,7 +1424,7 @@
               </a14:hiddenLine>
             </a:ext>
             <a:ext uri="{AF507438-7753-43e0-B8FC-AC1667EBCBE1}">
-              <a14:hiddenEffects xmlns="" xmlns:a14="http://schemas.microsoft.com/office/drawing/2010/main">
+              <a14:hiddenEffects xmlns:a14="http://schemas.microsoft.com/office/drawing/2010/main" xmlns="">
                 <a:effectLst>
                   <a:outerShdw blurRad="63500" dist="38099" dir="2700000" algn="ctr" rotWithShape="0">
                     <a:schemeClr val="bg2">
@@ -1434,7 +1435,7 @@
               </a14:hiddenEffects>
             </a:ext>
             <a:ext uri="{FAA26D3D-D897-4be2-8F04-BA451C77F1D7}">
-              <ma14:placeholderFlag xmlns="" xmlns:ma14="http://schemas.microsoft.com/office/mac/drawingml/2011/main" val="1"/>
+              <ma14:placeholderFlag xmlns:ma14="http://schemas.microsoft.com/office/mac/drawingml/2011/main" xmlns="" val="1"/>
             </a:ext>
           </a:extLst>
         </p:spPr>
@@ -1585,7 +1586,7 @@
           <a:ln/>
           <a:extLst>
             <a:ext uri="{FAA26D3D-D897-4be2-8F04-BA451C77F1D7}">
-              <ma14:placeholderFlag xmlns="" xmlns:ma14="http://schemas.microsoft.com/office/mac/drawingml/2011/main" val="1"/>
+              <ma14:placeholderFlag xmlns:ma14="http://schemas.microsoft.com/office/mac/drawingml/2011/main" xmlns="" val="1"/>
             </a:ext>
           </a:extLst>
         </p:spPr>
@@ -1781,14 +1782,14 @@
         <p:spPr>
           <a:extLst>
             <a:ext uri="{909E8E84-426E-40dd-AFC4-6F175D3DCCD1}">
-              <a14:hiddenFill xmlns="" xmlns:a14="http://schemas.microsoft.com/office/drawing/2010/main">
+              <a14:hiddenFill xmlns:a14="http://schemas.microsoft.com/office/drawing/2010/main" xmlns="">
                 <a:solidFill>
                   <a:schemeClr val="accent1"/>
                 </a:solidFill>
               </a14:hiddenFill>
             </a:ext>
             <a:ext uri="{91240B29-F687-4f45-9708-019B960494DF}">
-              <a14:hiddenLine xmlns="" xmlns:a14="http://schemas.microsoft.com/office/drawing/2010/main" w="9525">
+              <a14:hiddenLine xmlns:a14="http://schemas.microsoft.com/office/drawing/2010/main" xmlns="" w="9525">
                 <a:solidFill>
                   <a:schemeClr val="tx1"/>
                 </a:solidFill>
@@ -1798,7 +1799,7 @@
               </a14:hiddenLine>
             </a:ext>
             <a:ext uri="{AF507438-7753-43e0-B8FC-AC1667EBCBE1}">
-              <a14:hiddenEffects xmlns="" xmlns:a14="http://schemas.microsoft.com/office/drawing/2010/main">
+              <a14:hiddenEffects xmlns:a14="http://schemas.microsoft.com/office/drawing/2010/main" xmlns="">
                 <a:effectLst>
                   <a:outerShdw blurRad="63500" dist="38099" dir="2700000" algn="ctr" rotWithShape="0">
                     <a:schemeClr val="bg2">
@@ -1809,7 +1810,7 @@
               </a14:hiddenEffects>
             </a:ext>
             <a:ext uri="{FAA26D3D-D897-4be2-8F04-BA451C77F1D7}">
-              <ma14:placeholderFlag xmlns="" xmlns:ma14="http://schemas.microsoft.com/office/mac/drawingml/2011/main" val="1"/>
+              <ma14:placeholderFlag xmlns:ma14="http://schemas.microsoft.com/office/mac/drawingml/2011/main" xmlns="" val="1"/>
             </a:ext>
           </a:extLst>
         </p:spPr>
@@ -1953,7 +1954,7 @@
           <a:ln/>
           <a:extLst>
             <a:ext uri="{FAA26D3D-D897-4be2-8F04-BA451C77F1D7}">
-              <ma14:placeholderFlag xmlns="" xmlns:ma14="http://schemas.microsoft.com/office/mac/drawingml/2011/main" val="1"/>
+              <ma14:placeholderFlag xmlns:ma14="http://schemas.microsoft.com/office/mac/drawingml/2011/main" xmlns="" val="1"/>
             </a:ext>
           </a:extLst>
         </p:spPr>
@@ -3936,7 +3937,7 @@
           <a:p>
             <a:fld id="{AB492EBA-42DD-B247-A5CA-4B9F9327C47E}" type="datetimeFigureOut">
               <a:rPr lang="en-US" smtClean="0"/>
-              <a:t>11/30/20</a:t>
+              <a:t>12/7/20</a:t>
             </a:fld>
             <a:endParaRPr lang="en-US"/>
           </a:p>
@@ -4031,7 +4032,7 @@
           <a:p>
             <a:fld id="{AB492EBA-42DD-B247-A5CA-4B9F9327C47E}" type="datetimeFigureOut">
               <a:rPr lang="en-US" smtClean="0"/>
-              <a:t>11/30/20</a:t>
+              <a:t>12/7/20</a:t>
             </a:fld>
             <a:endParaRPr lang="en-US"/>
           </a:p>
@@ -12160,7 +12161,7 @@
           <a:p>
             <a:fld id="{2AAA8945-93FC-CD4D-85EF-05021FBA20E6}" type="datetimeFigureOut">
               <a:rPr lang="en-US" smtClean="0"/>
-              <a:t>11/30/20</a:t>
+              <a:t>12/7/20</a:t>
             </a:fld>
             <a:endParaRPr lang="en-US"/>
           </a:p>
@@ -12273,7 +12274,7 @@
           <a:p>
             <a:fld id="{2AAA8945-93FC-CD4D-85EF-05021FBA20E6}" type="datetimeFigureOut">
               <a:rPr lang="en-US" smtClean="0"/>
-              <a:t>11/30/20</a:t>
+              <a:t>12/7/20</a:t>
             </a:fld>
             <a:endParaRPr lang="en-US"/>
           </a:p>
@@ -24856,35 +24857,6 @@
           </a:p>
         </p:txBody>
       </p:sp>
-      <p:sp>
-        <p:nvSpPr>
-          <p:cNvPr id="3" name="Text Placeholder 2"/>
-          <p:cNvSpPr>
-            <a:spLocks noGrp="1"/>
-          </p:cNvSpPr>
-          <p:nvPr>
-            <p:ph type="body" sz="quarter" idx="4294967295"/>
-          </p:nvPr>
-        </p:nvSpPr>
-        <p:spPr>
-          <a:xfrm>
-            <a:off x="0" y="19050"/>
-            <a:ext cx="2286000" cy="393700"/>
-          </a:xfrm>
-        </p:spPr>
-        <p:txBody>
-          <a:bodyPr>
-            <a:normAutofit fontScale="77500" lnSpcReduction="20000"/>
-          </a:bodyPr>
-          <a:lstStyle/>
-          <a:p>
-            <a:r>
-              <a:rPr lang="en-US" dirty="0"/>
-              <a:t>DNS behavior</a:t>
-            </a:r>
-          </a:p>
-        </p:txBody>
-      </p:sp>
       <p:pic>
         <p:nvPicPr>
           <p:cNvPr id="6" name="Picture 4" descr="C:\Users\shao\AppData\Local\Microsoft\Windows\Temporary Internet Files\Content.IE5\3DQKUAID\MC900434845[1].png"/>
@@ -26862,6 +26834,73 @@
       </p:par>
     </p:tnLst>
   </p:timing>
+</p:sld>
+</file>
+
+<file path=ppt/slides/slide26.xml><?xml version="1.0" encoding="utf-8"?>
+<p:sld xmlns:a="http://schemas.openxmlformats.org/drawingml/2006/main" xmlns:r="http://schemas.openxmlformats.org/officeDocument/2006/relationships" xmlns:p="http://schemas.openxmlformats.org/presentationml/2006/main">
+  <p:cSld>
+    <p:spTree>
+      <p:nvGrpSpPr>
+        <p:cNvPr id="1" name=""/>
+        <p:cNvGrpSpPr/>
+        <p:nvPr/>
+      </p:nvGrpSpPr>
+      <p:grpSpPr>
+        <a:xfrm>
+          <a:off x="0" y="0"/>
+          <a:ext cx="0" cy="0"/>
+          <a:chOff x="0" y="0"/>
+          <a:chExt cx="0" cy="0"/>
+        </a:xfrm>
+      </p:grpSpPr>
+      <p:sp>
+        <p:nvSpPr>
+          <p:cNvPr id="5" name="Title 4">
+            <a:extLst>
+              <a:ext uri="{FF2B5EF4-FFF2-40B4-BE49-F238E27FC236}">
+                <a16:creationId xmlns:a16="http://schemas.microsoft.com/office/drawing/2014/main" id="{3C485A7A-6D4C-6449-95D3-D40C9E876BB6}"/>
+              </a:ext>
+            </a:extLst>
+          </p:cNvPr>
+          <p:cNvSpPr>
+            <a:spLocks noGrp="1"/>
+          </p:cNvSpPr>
+          <p:nvPr>
+            <p:ph type="ctrTitle"/>
+          </p:nvPr>
+        </p:nvSpPr>
+        <p:spPr/>
+        <p:txBody>
+          <a:bodyPr>
+            <a:normAutofit/>
+          </a:bodyPr>
+          <a:lstStyle/>
+          <a:p>
+            <a:r>
+              <a:rPr lang="en-US" sz="4400" dirty="0"/>
+              <a:t>Demonstration:</a:t>
+            </a:r>
+            <a:br>
+              <a:rPr lang="en-US" sz="4400" dirty="0"/>
+            </a:br>
+            <a:r>
+              <a:rPr lang="en-US" sz="4400" dirty="0"/>
+              <a:t>Supervised Classification</a:t>
+            </a:r>
+          </a:p>
+        </p:txBody>
+      </p:sp>
+    </p:spTree>
+    <p:extLst>
+      <p:ext uri="{BB962C8B-B14F-4D97-AF65-F5344CB8AC3E}">
+        <p14:creationId xmlns:p14="http://schemas.microsoft.com/office/powerpoint/2010/main" val="4094194056"/>
+      </p:ext>
+    </p:extLst>
+  </p:cSld>
+  <p:clrMapOvr>
+    <a:masterClrMapping/>
+  </p:clrMapOvr>
 </p:sld>
 </file>
 

</xml_diff>

<commit_message>
lecture module slide edits, 3.2, etc.
</commit_message>
<xml_diff>
--- a/module-3/ppt/3.2-Supervised Learning.pptx
+++ b/module-3/ppt/3.2-Supervised Learning.pptx
@@ -223,7 +223,7 @@
           <a:p>
             <a:fld id="{ECC93BED-D6B3-334D-9CE3-F2869B7E72EB}" type="datetimeFigureOut">
               <a:rPr lang="en-US" smtClean="0"/>
-              <a:t>12/7/20</a:t>
+              <a:t>1/28/21</a:t>
             </a:fld>
             <a:endParaRPr lang="en-US"/>
           </a:p>
@@ -887,14 +887,14 @@
         <p:spPr>
           <a:extLst>
             <a:ext uri="{909E8E84-426E-40dd-AFC4-6F175D3DCCD1}">
-              <a14:hiddenFill xmlns:a14="http://schemas.microsoft.com/office/drawing/2010/main" xmlns="">
+              <a14:hiddenFill xmlns="" xmlns:a14="http://schemas.microsoft.com/office/drawing/2010/main">
                 <a:solidFill>
                   <a:schemeClr val="accent1"/>
                 </a:solidFill>
               </a14:hiddenFill>
             </a:ext>
             <a:ext uri="{91240B29-F687-4f45-9708-019B960494DF}">
-              <a14:hiddenLine xmlns:a14="http://schemas.microsoft.com/office/drawing/2010/main" xmlns="" w="9525">
+              <a14:hiddenLine xmlns="" xmlns:a14="http://schemas.microsoft.com/office/drawing/2010/main" w="9525">
                 <a:solidFill>
                   <a:schemeClr val="tx1"/>
                 </a:solidFill>
@@ -904,7 +904,7 @@
               </a14:hiddenLine>
             </a:ext>
             <a:ext uri="{AF507438-7753-43e0-B8FC-AC1667EBCBE1}">
-              <a14:hiddenEffects xmlns:a14="http://schemas.microsoft.com/office/drawing/2010/main" xmlns="">
+              <a14:hiddenEffects xmlns="" xmlns:a14="http://schemas.microsoft.com/office/drawing/2010/main">
                 <a:effectLst>
                   <a:outerShdw blurRad="63500" dist="38099" dir="2700000" algn="ctr" rotWithShape="0">
                     <a:schemeClr val="bg2">
@@ -915,7 +915,7 @@
               </a14:hiddenEffects>
             </a:ext>
             <a:ext uri="{FAA26D3D-D897-4be2-8F04-BA451C77F1D7}">
-              <ma14:placeholderFlag xmlns:ma14="http://schemas.microsoft.com/office/mac/drawingml/2011/main" xmlns="" val="1"/>
+              <ma14:placeholderFlag xmlns="" xmlns:ma14="http://schemas.microsoft.com/office/mac/drawingml/2011/main" val="1"/>
             </a:ext>
           </a:extLst>
         </p:spPr>
@@ -1059,7 +1059,7 @@
           <a:ln/>
           <a:extLst>
             <a:ext uri="{FAA26D3D-D897-4be2-8F04-BA451C77F1D7}">
-              <ma14:placeholderFlag xmlns:ma14="http://schemas.microsoft.com/office/mac/drawingml/2011/main" xmlns="" val="1"/>
+              <ma14:placeholderFlag xmlns="" xmlns:ma14="http://schemas.microsoft.com/office/mac/drawingml/2011/main" val="1"/>
             </a:ext>
           </a:extLst>
         </p:spPr>
@@ -1143,14 +1143,14 @@
         <p:spPr>
           <a:extLst>
             <a:ext uri="{909E8E84-426E-40dd-AFC4-6F175D3DCCD1}">
-              <a14:hiddenFill xmlns:a14="http://schemas.microsoft.com/office/drawing/2010/main" xmlns="">
+              <a14:hiddenFill xmlns="" xmlns:a14="http://schemas.microsoft.com/office/drawing/2010/main">
                 <a:solidFill>
                   <a:schemeClr val="accent1"/>
                 </a:solidFill>
               </a14:hiddenFill>
             </a:ext>
             <a:ext uri="{91240B29-F687-4f45-9708-019B960494DF}">
-              <a14:hiddenLine xmlns:a14="http://schemas.microsoft.com/office/drawing/2010/main" xmlns="" w="9525">
+              <a14:hiddenLine xmlns="" xmlns:a14="http://schemas.microsoft.com/office/drawing/2010/main" w="9525">
                 <a:solidFill>
                   <a:schemeClr val="tx1"/>
                 </a:solidFill>
@@ -1160,7 +1160,7 @@
               </a14:hiddenLine>
             </a:ext>
             <a:ext uri="{AF507438-7753-43e0-B8FC-AC1667EBCBE1}">
-              <a14:hiddenEffects xmlns:a14="http://schemas.microsoft.com/office/drawing/2010/main" xmlns="">
+              <a14:hiddenEffects xmlns="" xmlns:a14="http://schemas.microsoft.com/office/drawing/2010/main">
                 <a:effectLst>
                   <a:outerShdw blurRad="63500" dist="38099" dir="2700000" algn="ctr" rotWithShape="0">
                     <a:schemeClr val="bg2">
@@ -1171,7 +1171,7 @@
               </a14:hiddenEffects>
             </a:ext>
             <a:ext uri="{FAA26D3D-D897-4be2-8F04-BA451C77F1D7}">
-              <ma14:placeholderFlag xmlns:ma14="http://schemas.microsoft.com/office/mac/drawingml/2011/main" xmlns="" val="1"/>
+              <ma14:placeholderFlag xmlns="" xmlns:ma14="http://schemas.microsoft.com/office/mac/drawingml/2011/main" val="1"/>
             </a:ext>
           </a:extLst>
         </p:spPr>
@@ -1315,7 +1315,7 @@
           <a:ln/>
           <a:extLst>
             <a:ext uri="{FAA26D3D-D897-4be2-8F04-BA451C77F1D7}">
-              <ma14:placeholderFlag xmlns:ma14="http://schemas.microsoft.com/office/mac/drawingml/2011/main" xmlns="" val="1"/>
+              <ma14:placeholderFlag xmlns="" xmlns:ma14="http://schemas.microsoft.com/office/mac/drawingml/2011/main" val="1"/>
             </a:ext>
           </a:extLst>
         </p:spPr>
@@ -1407,14 +1407,14 @@
         <p:spPr>
           <a:extLst>
             <a:ext uri="{909E8E84-426E-40dd-AFC4-6F175D3DCCD1}">
-              <a14:hiddenFill xmlns:a14="http://schemas.microsoft.com/office/drawing/2010/main" xmlns="">
+              <a14:hiddenFill xmlns="" xmlns:a14="http://schemas.microsoft.com/office/drawing/2010/main">
                 <a:solidFill>
                   <a:schemeClr val="accent1"/>
                 </a:solidFill>
               </a14:hiddenFill>
             </a:ext>
             <a:ext uri="{91240B29-F687-4f45-9708-019B960494DF}">
-              <a14:hiddenLine xmlns:a14="http://schemas.microsoft.com/office/drawing/2010/main" xmlns="" w="9525">
+              <a14:hiddenLine xmlns="" xmlns:a14="http://schemas.microsoft.com/office/drawing/2010/main" w="9525">
                 <a:solidFill>
                   <a:schemeClr val="tx1"/>
                 </a:solidFill>
@@ -1424,7 +1424,7 @@
               </a14:hiddenLine>
             </a:ext>
             <a:ext uri="{AF507438-7753-43e0-B8FC-AC1667EBCBE1}">
-              <a14:hiddenEffects xmlns:a14="http://schemas.microsoft.com/office/drawing/2010/main" xmlns="">
+              <a14:hiddenEffects xmlns="" xmlns:a14="http://schemas.microsoft.com/office/drawing/2010/main">
                 <a:effectLst>
                   <a:outerShdw blurRad="63500" dist="38099" dir="2700000" algn="ctr" rotWithShape="0">
                     <a:schemeClr val="bg2">
@@ -1435,7 +1435,7 @@
               </a14:hiddenEffects>
             </a:ext>
             <a:ext uri="{FAA26D3D-D897-4be2-8F04-BA451C77F1D7}">
-              <ma14:placeholderFlag xmlns:ma14="http://schemas.microsoft.com/office/mac/drawingml/2011/main" xmlns="" val="1"/>
+              <ma14:placeholderFlag xmlns="" xmlns:ma14="http://schemas.microsoft.com/office/mac/drawingml/2011/main" val="1"/>
             </a:ext>
           </a:extLst>
         </p:spPr>
@@ -1586,7 +1586,7 @@
           <a:ln/>
           <a:extLst>
             <a:ext uri="{FAA26D3D-D897-4be2-8F04-BA451C77F1D7}">
-              <ma14:placeholderFlag xmlns:ma14="http://schemas.microsoft.com/office/mac/drawingml/2011/main" xmlns="" val="1"/>
+              <ma14:placeholderFlag xmlns="" xmlns:ma14="http://schemas.microsoft.com/office/mac/drawingml/2011/main" val="1"/>
             </a:ext>
           </a:extLst>
         </p:spPr>
@@ -1782,14 +1782,14 @@
         <p:spPr>
           <a:extLst>
             <a:ext uri="{909E8E84-426E-40dd-AFC4-6F175D3DCCD1}">
-              <a14:hiddenFill xmlns:a14="http://schemas.microsoft.com/office/drawing/2010/main" xmlns="">
+              <a14:hiddenFill xmlns="" xmlns:a14="http://schemas.microsoft.com/office/drawing/2010/main">
                 <a:solidFill>
                   <a:schemeClr val="accent1"/>
                 </a:solidFill>
               </a14:hiddenFill>
             </a:ext>
             <a:ext uri="{91240B29-F687-4f45-9708-019B960494DF}">
-              <a14:hiddenLine xmlns:a14="http://schemas.microsoft.com/office/drawing/2010/main" xmlns="" w="9525">
+              <a14:hiddenLine xmlns="" xmlns:a14="http://schemas.microsoft.com/office/drawing/2010/main" w="9525">
                 <a:solidFill>
                   <a:schemeClr val="tx1"/>
                 </a:solidFill>
@@ -1799,7 +1799,7 @@
               </a14:hiddenLine>
             </a:ext>
             <a:ext uri="{AF507438-7753-43e0-B8FC-AC1667EBCBE1}">
-              <a14:hiddenEffects xmlns:a14="http://schemas.microsoft.com/office/drawing/2010/main" xmlns="">
+              <a14:hiddenEffects xmlns="" xmlns:a14="http://schemas.microsoft.com/office/drawing/2010/main">
                 <a:effectLst>
                   <a:outerShdw blurRad="63500" dist="38099" dir="2700000" algn="ctr" rotWithShape="0">
                     <a:schemeClr val="bg2">
@@ -1810,7 +1810,7 @@
               </a14:hiddenEffects>
             </a:ext>
             <a:ext uri="{FAA26D3D-D897-4be2-8F04-BA451C77F1D7}">
-              <ma14:placeholderFlag xmlns:ma14="http://schemas.microsoft.com/office/mac/drawingml/2011/main" xmlns="" val="1"/>
+              <ma14:placeholderFlag xmlns="" xmlns:ma14="http://schemas.microsoft.com/office/mac/drawingml/2011/main" val="1"/>
             </a:ext>
           </a:extLst>
         </p:spPr>
@@ -1954,7 +1954,7 @@
           <a:ln/>
           <a:extLst>
             <a:ext uri="{FAA26D3D-D897-4be2-8F04-BA451C77F1D7}">
-              <ma14:placeholderFlag xmlns:ma14="http://schemas.microsoft.com/office/mac/drawingml/2011/main" xmlns="" val="1"/>
+              <ma14:placeholderFlag xmlns="" xmlns:ma14="http://schemas.microsoft.com/office/mac/drawingml/2011/main" val="1"/>
             </a:ext>
           </a:extLst>
         </p:spPr>
@@ -3937,7 +3937,7 @@
           <a:p>
             <a:fld id="{AB492EBA-42DD-B247-A5CA-4B9F9327C47E}" type="datetimeFigureOut">
               <a:rPr lang="en-US" smtClean="0"/>
-              <a:t>12/7/20</a:t>
+              <a:t>1/28/21</a:t>
             </a:fld>
             <a:endParaRPr lang="en-US"/>
           </a:p>
@@ -4032,7 +4032,7 @@
           <a:p>
             <a:fld id="{AB492EBA-42DD-B247-A5CA-4B9F9327C47E}" type="datetimeFigureOut">
               <a:rPr lang="en-US" smtClean="0"/>
-              <a:t>12/7/20</a:t>
+              <a:t>1/28/21</a:t>
             </a:fld>
             <a:endParaRPr lang="en-US"/>
           </a:p>
@@ -12161,7 +12161,7 @@
           <a:p>
             <a:fld id="{2AAA8945-93FC-CD4D-85EF-05021FBA20E6}" type="datetimeFigureOut">
               <a:rPr lang="en-US" smtClean="0"/>
-              <a:t>12/7/20</a:t>
+              <a:t>1/28/21</a:t>
             </a:fld>
             <a:endParaRPr lang="en-US"/>
           </a:p>
@@ -12274,7 +12274,7 @@
           <a:p>
             <a:fld id="{2AAA8945-93FC-CD4D-85EF-05021FBA20E6}" type="datetimeFigureOut">
               <a:rPr lang="en-US" smtClean="0"/>
-              <a:t>12/7/20</a:t>
+              <a:t>1/28/21</a:t>
             </a:fld>
             <a:endParaRPr lang="en-US"/>
           </a:p>
@@ -14582,7 +14582,7 @@
           <a:p>
             <a:r>
               <a:rPr lang="en-US" dirty="0"/>
-              <a:t>Domain registration analysis</a:t>
+              <a:t>Domain Registration Analysis</a:t>
             </a:r>
           </a:p>
         </p:txBody>
@@ -14611,71 +14611,32 @@
             <a:endParaRPr lang="en-US" dirty="0"/>
           </a:p>
           <a:p>
+            <a:r>
+              <a:rPr lang="en-US" b="1" dirty="0">
+                <a:solidFill>
+                  <a:schemeClr val="accent1"/>
+                </a:solidFill>
+              </a:rPr>
+              <a:t>Characterization:</a:t>
+            </a:r>
+            <a:r>
+              <a:rPr lang="en-US" dirty="0"/>
+              <a:t> How the domain is registered?</a:t>
+            </a:r>
+          </a:p>
+          <a:p>
             <a:pPr lvl="1"/>
             <a:r>
-              <a:rPr lang="en-US" dirty="0">
-                <a:solidFill>
-                  <a:srgbClr val="000090"/>
-                </a:solidFill>
-              </a:rPr>
-              <a:t>Characterization</a:t>
-            </a:r>
-            <a:r>
               <a:rPr lang="en-US" dirty="0"/>
-              <a:t>: How the domain is registered?</a:t>
-            </a:r>
-          </a:p>
-          <a:p>
-            <a:pPr lvl="2"/>
-            <a:r>
-              <a:rPr lang="en-US" i="1" dirty="0"/>
-              <a:t>Fact</a:t>
-            </a:r>
+              <a:t>Fact: Tens of thousands of domains registered to maintain spam campaigns</a:t>
+            </a:r>
+          </a:p>
+          <a:p>
+            <a:pPr lvl="1"/>
             <a:r>
               <a:rPr lang="en-US" dirty="0"/>
-              <a:t>:  Tens of thousands of domains registered to maintain spam campaigns</a:t>
-            </a:r>
-          </a:p>
-          <a:p>
-            <a:pPr lvl="2"/>
-            <a:r>
-              <a:rPr lang="en-US" i="1" dirty="0"/>
-              <a:t>Intuition</a:t>
-            </a:r>
-            <a:r>
-              <a:rPr lang="en-US" dirty="0"/>
-              <a:t>: Registration behavior is different due to spammers’ economic or management concerns</a:t>
-            </a:r>
-          </a:p>
-        </p:txBody>
-      </p:sp>
-      <p:sp>
-        <p:nvSpPr>
-          <p:cNvPr id="3" name="Text Placeholder 2"/>
-          <p:cNvSpPr>
-            <a:spLocks noGrp="1"/>
-          </p:cNvSpPr>
-          <p:nvPr>
-            <p:ph type="body" sz="quarter" idx="4294967295"/>
-          </p:nvPr>
-        </p:nvSpPr>
-        <p:spPr>
-          <a:xfrm>
-            <a:off x="0" y="19050"/>
-            <a:ext cx="2286000" cy="393700"/>
-          </a:xfrm>
-        </p:spPr>
-        <p:txBody>
-          <a:bodyPr>
-            <a:normAutofit fontScale="85000" lnSpcReduction="20000"/>
-          </a:bodyPr>
-          <a:lstStyle/>
-          <a:p>
-            <a:r>
-              <a:rPr lang="en-US" altLang="zh-CN" dirty="0"/>
-              <a:t>Registration</a:t>
-            </a:r>
-            <a:endParaRPr lang="en-US" dirty="0"/>
+              <a:t>Intuition: Registration behavior is different due to spammers’ economic or management concerns</a:t>
+            </a:r>
           </a:p>
         </p:txBody>
       </p:sp>
@@ -14687,7 +14648,7 @@
         </p:nvSpPr>
         <p:spPr>
           <a:xfrm>
-            <a:off x="2646892" y="6126481"/>
+            <a:off x="2537164" y="5393308"/>
             <a:ext cx="6898216" cy="307777"/>
           </a:xfrm>
           <a:prstGeom prst="rect">
@@ -14890,29 +14851,7 @@
           <a:p>
             <a:r>
               <a:rPr lang="en-US" dirty="0"/>
-              <a:t>Domain registration process</a:t>
-            </a:r>
-          </a:p>
-        </p:txBody>
-      </p:sp>
-      <p:sp>
-        <p:nvSpPr>
-          <p:cNvPr id="3" name="Text Placeholder 2"/>
-          <p:cNvSpPr>
-            <a:spLocks noGrp="1"/>
-          </p:cNvSpPr>
-          <p:nvPr>
-            <p:ph idx="1"/>
-          </p:nvPr>
-        </p:nvSpPr>
-        <p:spPr/>
-        <p:txBody>
-          <a:bodyPr/>
-          <a:lstStyle/>
-          <a:p>
-            <a:r>
-              <a:rPr lang="en-US" dirty="0"/>
-              <a:t>Registration</a:t>
+              <a:t>Domain Registration Process</a:t>
             </a:r>
           </a:p>
         </p:txBody>
@@ -14939,7 +14878,7 @@
         </p:blipFill>
         <p:spPr>
           <a:xfrm>
-            <a:off x="2730279" y="3592777"/>
+            <a:off x="2723135" y="3285595"/>
             <a:ext cx="615315" cy="593725"/>
           </a:xfrm>
           <a:prstGeom prst="rect">
@@ -14955,7 +14894,7 @@
         </p:nvSpPr>
         <p:spPr>
           <a:xfrm>
-            <a:off x="4817076" y="4547402"/>
+            <a:off x="4809932" y="4240220"/>
             <a:ext cx="1189904" cy="1562099"/>
           </a:xfrm>
           <a:prstGeom prst="roundRect">
@@ -15016,7 +14955,7 @@
         </p:blipFill>
         <p:spPr>
           <a:xfrm>
-            <a:off x="5215377" y="5093754"/>
+            <a:off x="5208233" y="4786572"/>
             <a:ext cx="520192" cy="520192"/>
           </a:xfrm>
           <a:prstGeom prst="rect">
@@ -15032,7 +14971,7 @@
         </p:nvGrpSpPr>
         <p:grpSpPr>
           <a:xfrm>
-            <a:off x="4962229" y="1743224"/>
+            <a:off x="4955085" y="1436042"/>
             <a:ext cx="899598" cy="899598"/>
             <a:chOff x="3438229" y="5412724"/>
             <a:chExt cx="899598" cy="899598"/>
@@ -15126,7 +15065,7 @@
         </p:nvSpPr>
         <p:spPr>
           <a:xfrm>
-            <a:off x="4880524" y="5523050"/>
+            <a:off x="4873380" y="5215868"/>
             <a:ext cx="1063011" cy="338554"/>
           </a:xfrm>
           <a:prstGeom prst="rect">
@@ -15158,7 +15097,7 @@
         </p:nvCxnSpPr>
         <p:spPr>
           <a:xfrm>
-            <a:off x="5412028" y="4039612"/>
+            <a:off x="5404884" y="3732430"/>
             <a:ext cx="0" cy="497613"/>
           </a:xfrm>
           <a:prstGeom prst="straightConnector1">
@@ -15196,7 +15135,7 @@
         </p:nvCxnSpPr>
         <p:spPr>
           <a:xfrm>
-            <a:off x="5412028" y="2642401"/>
+            <a:off x="5404884" y="2335219"/>
             <a:ext cx="0" cy="497613"/>
           </a:xfrm>
           <a:prstGeom prst="straightConnector1">
@@ -15234,7 +15173,7 @@
         </p:nvCxnSpPr>
         <p:spPr>
           <a:xfrm>
-            <a:off x="5412029" y="4559164"/>
+            <a:off x="5404885" y="4251982"/>
             <a:ext cx="1" cy="534336"/>
           </a:xfrm>
           <a:prstGeom prst="straightConnector1">
@@ -15272,7 +15211,7 @@
         </p:nvSpPr>
         <p:spPr>
           <a:xfrm>
-            <a:off x="1896538" y="5939538"/>
+            <a:off x="1889394" y="5632356"/>
             <a:ext cx="2248733" cy="338554"/>
           </a:xfrm>
           <a:prstGeom prst="rect">
@@ -15329,7 +15268,7 @@
         </p:blipFill>
         <p:spPr>
           <a:xfrm>
-            <a:off x="2730279" y="4404850"/>
+            <a:off x="2723135" y="4097668"/>
             <a:ext cx="615315" cy="593725"/>
           </a:xfrm>
           <a:prstGeom prst="rect">
@@ -15359,7 +15298,7 @@
         </p:blipFill>
         <p:spPr>
           <a:xfrm>
-            <a:off x="2730279" y="5216923"/>
+            <a:off x="2723135" y="4909741"/>
             <a:ext cx="615315" cy="593725"/>
           </a:xfrm>
           <a:prstGeom prst="rect">
@@ -15375,7 +15314,7 @@
         </p:nvCxnSpPr>
         <p:spPr>
           <a:xfrm flipH="1">
-            <a:off x="3345593" y="5502751"/>
+            <a:off x="3338449" y="5195569"/>
             <a:ext cx="1869786" cy="12489"/>
           </a:xfrm>
           <a:prstGeom prst="straightConnector1">
@@ -15412,7 +15351,7 @@
         </p:nvCxnSpPr>
         <p:spPr>
           <a:xfrm flipH="1" flipV="1">
-            <a:off x="3345593" y="4800017"/>
+            <a:off x="3338449" y="4492835"/>
             <a:ext cx="1869790" cy="572982"/>
           </a:xfrm>
           <a:prstGeom prst="straightConnector1">
@@ -15449,7 +15388,7 @@
         </p:nvCxnSpPr>
         <p:spPr>
           <a:xfrm flipH="1" flipV="1">
-            <a:off x="3345593" y="4033786"/>
+            <a:off x="3338449" y="3726604"/>
             <a:ext cx="1869792" cy="1212115"/>
           </a:xfrm>
           <a:prstGeom prst="straightConnector1">
@@ -15486,7 +15425,7 @@
         </p:nvSpPr>
         <p:spPr>
           <a:xfrm>
-            <a:off x="3742483" y="5499986"/>
+            <a:off x="3735339" y="5192804"/>
             <a:ext cx="761747" cy="307777"/>
           </a:xfrm>
           <a:prstGeom prst="rect">
@@ -15520,7 +15459,7 @@
         </p:nvSpPr>
         <p:spPr>
           <a:xfrm>
-            <a:off x="6431778" y="4919741"/>
+            <a:off x="6424634" y="4612559"/>
             <a:ext cx="3613922" cy="817421"/>
           </a:xfrm>
           <a:prstGeom prst="rect">
@@ -15716,7 +15655,7 @@
         </p:nvSpPr>
         <p:spPr>
           <a:xfrm>
-            <a:off x="6431778" y="3251526"/>
+            <a:off x="6424634" y="2944344"/>
             <a:ext cx="3906022" cy="676572"/>
           </a:xfrm>
           <a:prstGeom prst="rect">
@@ -15916,7 +15855,7 @@
         </p:nvSpPr>
         <p:spPr>
           <a:xfrm>
-            <a:off x="6431778" y="1966252"/>
+            <a:off x="6424634" y="1659070"/>
             <a:ext cx="1429522" cy="453545"/>
           </a:xfrm>
           <a:prstGeom prst="rect">
@@ -16087,7 +16026,7 @@
         </p:nvGrpSpPr>
         <p:grpSpPr>
           <a:xfrm>
-            <a:off x="4962229" y="3140013"/>
+            <a:off x="4955085" y="2832831"/>
             <a:ext cx="899598" cy="899598"/>
             <a:chOff x="3438229" y="4043195"/>
             <a:chExt cx="899598" cy="899598"/>
@@ -16712,28 +16651,6 @@
           </a:p>
         </p:txBody>
       </p:sp>
-      <p:sp>
-        <p:nvSpPr>
-          <p:cNvPr id="3" name="Text Placeholder 2"/>
-          <p:cNvSpPr>
-            <a:spLocks noGrp="1"/>
-          </p:cNvSpPr>
-          <p:nvPr>
-            <p:ph idx="1"/>
-          </p:nvPr>
-        </p:nvSpPr>
-        <p:spPr/>
-        <p:txBody>
-          <a:bodyPr/>
-          <a:lstStyle/>
-          <a:p>
-            <a:r>
-              <a:rPr lang="en-US" dirty="0"/>
-              <a:t>Registration</a:t>
-            </a:r>
-          </a:p>
-        </p:txBody>
-      </p:sp>
       <p:graphicFrame>
         <p:nvGraphicFramePr>
           <p:cNvPr id="6" name="Table 5"/>
@@ -17340,8 +17257,8 @@
         </p:nvSpPr>
         <p:spPr bwMode="auto">
           <a:xfrm>
-            <a:off x="1922464" y="5325227"/>
-            <a:ext cx="8347075" cy="838200"/>
+            <a:off x="628650" y="5325227"/>
+            <a:ext cx="11072813" cy="555015"/>
           </a:xfrm>
           <a:prstGeom prst="rect">
             <a:avLst/>
@@ -18774,8 +18691,8 @@
         </p:blipFill>
         <p:spPr>
           <a:xfrm>
-            <a:off x="1541131" y="1599696"/>
-            <a:ext cx="6195060" cy="4926330"/>
+            <a:off x="2099733" y="1350286"/>
+            <a:ext cx="5689602" cy="4524388"/>
           </a:xfrm>
           <a:prstGeom prst="rect">
             <a:avLst/>
@@ -18801,7 +18718,7 @@
           <a:p>
             <a:r>
               <a:rPr lang="en-US" dirty="0"/>
-              <a:t>Spam proportions on registrars</a:t>
+              <a:t>Spam Proportions on Registrars</a:t>
             </a:r>
           </a:p>
         </p:txBody>
@@ -18816,7 +18733,12 @@
             <p:ph idx="1"/>
           </p:nvPr>
         </p:nvSpPr>
-        <p:spPr/>
+        <p:spPr>
+          <a:xfrm>
+            <a:off x="838199" y="1350286"/>
+            <a:ext cx="10515600" cy="4157428"/>
+          </a:xfrm>
+        </p:spPr>
         <p:txBody>
           <a:bodyPr>
             <a:normAutofit/>
@@ -18834,35 +18756,6 @@
             <a:r>
               <a:rPr lang="en-US" sz="2400" dirty="0"/>
               <a:t> spammer domains?</a:t>
-            </a:r>
-          </a:p>
-        </p:txBody>
-      </p:sp>
-      <p:sp>
-        <p:nvSpPr>
-          <p:cNvPr id="3" name="Text Placeholder 2"/>
-          <p:cNvSpPr>
-            <a:spLocks noGrp="1"/>
-          </p:cNvSpPr>
-          <p:nvPr>
-            <p:ph type="body" sz="quarter" idx="4294967295"/>
-          </p:nvPr>
-        </p:nvSpPr>
-        <p:spPr>
-          <a:xfrm>
-            <a:off x="0" y="19050"/>
-            <a:ext cx="2286000" cy="393700"/>
-          </a:xfrm>
-        </p:spPr>
-        <p:txBody>
-          <a:bodyPr>
-            <a:normAutofit fontScale="85000" lnSpcReduction="20000"/>
-          </a:bodyPr>
-          <a:lstStyle/>
-          <a:p>
-            <a:r>
-              <a:rPr lang="en-US" dirty="0"/>
-              <a:t>Registration</a:t>
             </a:r>
           </a:p>
         </p:txBody>
@@ -18924,7 +18817,7 @@
         </p:nvSpPr>
         <p:spPr bwMode="auto">
           <a:xfrm>
-            <a:off x="7789335" y="3092419"/>
+            <a:off x="8164936" y="2399475"/>
             <a:ext cx="2302932" cy="1945127"/>
           </a:xfrm>
           <a:prstGeom prst="rect">
@@ -19273,7 +19166,7 @@
           <a:p>
             <a:r>
               <a:rPr lang="en-US" altLang="zh-CN" dirty="0"/>
-              <a:t>An example of bulk registration</a:t>
+              <a:t>An Example of Bulk Registration</a:t>
             </a:r>
             <a:endParaRPr lang="en-US" dirty="0"/>
           </a:p>
@@ -19289,7 +19182,12 @@
             <p:ph idx="1"/>
           </p:nvPr>
         </p:nvSpPr>
-        <p:spPr/>
+        <p:spPr>
+          <a:xfrm>
+            <a:off x="8447683" y="1478366"/>
+            <a:ext cx="2926556" cy="1435777"/>
+          </a:xfrm>
+        </p:spPr>
         <p:txBody>
           <a:bodyPr>
             <a:normAutofit/>
@@ -19297,57 +19195,28 @@
           <a:lstStyle/>
           <a:p>
             <a:r>
-              <a:rPr lang="en-US" sz="2400" dirty="0"/>
+              <a:rPr lang="en-US" sz="2000" dirty="0"/>
               <a:t>Domains registered by </a:t>
             </a:r>
             <a:r>
-              <a:rPr lang="en-US" sz="2400" i="1" dirty="0" err="1"/>
+              <a:rPr lang="en-US" sz="2000" i="1" dirty="0" err="1"/>
               <a:t>eNom</a:t>
             </a:r>
             <a:r>
-              <a:rPr lang="en-US" sz="2400" i="1" dirty="0"/>
+              <a:rPr lang="en-US" sz="2000" i="1" dirty="0"/>
               <a:t> </a:t>
             </a:r>
             <a:r>
-              <a:rPr lang="en-US" sz="2400" dirty="0"/>
+              <a:rPr lang="en-US" sz="2000" dirty="0"/>
               <a:t>every 5 minutes in March 5</a:t>
             </a:r>
             <a:r>
-              <a:rPr lang="en-US" sz="2400" baseline="30000" dirty="0"/>
+              <a:rPr lang="en-US" sz="2000" baseline="30000" dirty="0"/>
               <a:t>th</a:t>
             </a:r>
             <a:r>
-              <a:rPr lang="en-US" sz="2400" dirty="0"/>
+              <a:rPr lang="en-US" sz="2000" dirty="0"/>
               <a:t>, 2012</a:t>
-            </a:r>
-          </a:p>
-        </p:txBody>
-      </p:sp>
-      <p:sp>
-        <p:nvSpPr>
-          <p:cNvPr id="3" name="Text Placeholder 2"/>
-          <p:cNvSpPr>
-            <a:spLocks noGrp="1"/>
-          </p:cNvSpPr>
-          <p:nvPr>
-            <p:ph type="body" sz="quarter" idx="4294967295"/>
-          </p:nvPr>
-        </p:nvSpPr>
-        <p:spPr>
-          <a:xfrm>
-            <a:off x="0" y="19050"/>
-            <a:ext cx="2286000" cy="393700"/>
-          </a:xfrm>
-        </p:spPr>
-        <p:txBody>
-          <a:bodyPr>
-            <a:normAutofit fontScale="85000" lnSpcReduction="20000"/>
-          </a:bodyPr>
-          <a:lstStyle/>
-          <a:p>
-            <a:r>
-              <a:rPr lang="en-US" dirty="0"/>
-              <a:t>Registration</a:t>
             </a:r>
           </a:p>
         </p:txBody>
@@ -19798,7 +19667,7 @@
         </p:blipFill>
         <p:spPr>
           <a:xfrm>
-            <a:off x="1597152" y="2212848"/>
+            <a:off x="1175671" y="1721593"/>
             <a:ext cx="4754880" cy="3566160"/>
           </a:xfrm>
           <a:prstGeom prst="rect">
@@ -20001,29 +19870,7 @@
           <a:p>
             <a:r>
               <a:rPr lang="en-US" dirty="0"/>
-              <a:t>Modeling registration batch sizes</a:t>
-            </a:r>
-          </a:p>
-        </p:txBody>
-      </p:sp>
-      <p:sp>
-        <p:nvSpPr>
-          <p:cNvPr id="3" name="Text Placeholder 2"/>
-          <p:cNvSpPr>
-            <a:spLocks noGrp="1"/>
-          </p:cNvSpPr>
-          <p:nvPr>
-            <p:ph idx="1"/>
-          </p:nvPr>
-        </p:nvSpPr>
-        <p:spPr/>
-        <p:txBody>
-          <a:bodyPr/>
-          <a:lstStyle/>
-          <a:p>
-            <a:r>
-              <a:rPr lang="en-US" dirty="0"/>
-              <a:t>Registration</a:t>
+              <a:t>Modeling Registration Batch Sizes</a:t>
             </a:r>
           </a:p>
         </p:txBody>
@@ -20038,7 +19885,7 @@
         </p:nvSpPr>
         <p:spPr>
           <a:xfrm>
-            <a:off x="2024065" y="5757629"/>
+            <a:off x="1602584" y="5266374"/>
             <a:ext cx="3750733" cy="969040"/>
           </a:xfrm>
           <a:prstGeom prst="rect">
@@ -20204,7 +20051,7 @@
         </p:nvSpPr>
         <p:spPr>
           <a:xfrm>
-            <a:off x="1792057" y="5888961"/>
+            <a:off x="1370576" y="5397706"/>
             <a:ext cx="4358279" cy="461040"/>
           </a:xfrm>
           <a:prstGeom prst="rect">
@@ -20393,7 +20240,7 @@
         </p:blipFill>
         <p:spPr>
           <a:xfrm>
-            <a:off x="1597152" y="2212848"/>
+            <a:off x="1175671" y="1721593"/>
             <a:ext cx="4754880" cy="3566160"/>
           </a:xfrm>
           <a:prstGeom prst="rect">
@@ -20411,7 +20258,7 @@
         </p:nvSpPr>
         <p:spPr>
           <a:xfrm>
-            <a:off x="4801055" y="4070543"/>
+            <a:off x="4379574" y="3579288"/>
             <a:ext cx="1617196" cy="789316"/>
           </a:xfrm>
           <a:prstGeom prst="rect">
@@ -20595,7 +20442,7 @@
         </p:nvCxnSpPr>
         <p:spPr>
           <a:xfrm>
-            <a:off x="5464975" y="4751934"/>
+            <a:off x="5043494" y="4260679"/>
             <a:ext cx="0" cy="463533"/>
           </a:xfrm>
           <a:prstGeom prst="straightConnector1">
@@ -21208,7 +21055,7 @@
           <a:p>
             <a:r>
               <a:rPr lang="en-US" dirty="0"/>
-              <a:t>Supervised learning: CPM</a:t>
+              <a:t>Supervised Learning: CPM</a:t>
             </a:r>
           </a:p>
         </p:txBody>
@@ -21253,35 +21100,6 @@
             <a:r>
               <a:rPr lang="en-US" dirty="0"/>
               <a:t>Train models fast</a:t>
-            </a:r>
-          </a:p>
-        </p:txBody>
-      </p:sp>
-      <p:sp>
-        <p:nvSpPr>
-          <p:cNvPr id="3" name="Text Placeholder 2"/>
-          <p:cNvSpPr>
-            <a:spLocks noGrp="1"/>
-          </p:cNvSpPr>
-          <p:nvPr>
-            <p:ph type="body" sz="quarter" idx="4294967295"/>
-          </p:nvPr>
-        </p:nvSpPr>
-        <p:spPr>
-          <a:xfrm>
-            <a:off x="0" y="19050"/>
-            <a:ext cx="2286000" cy="393700"/>
-          </a:xfrm>
-        </p:spPr>
-        <p:txBody>
-          <a:bodyPr>
-            <a:normAutofit fontScale="85000" lnSpcReduction="20000"/>
-          </a:bodyPr>
-          <a:lstStyle/>
-          <a:p>
-            <a:r>
-              <a:rPr lang="en-US" dirty="0"/>
-              <a:t>PREDATOR</a:t>
             </a:r>
           </a:p>
         </p:txBody>
@@ -23107,15 +22925,15 @@
               </a:lnSpc>
             </a:pPr>
             <a:r>
-              <a:rPr lang="en-US" altLang="en-US" sz="3000" b="1">
-                <a:solidFill>
-                  <a:srgbClr val="FF3300"/>
+              <a:rPr lang="en-US" altLang="en-US" sz="3000" b="1" dirty="0">
+                <a:solidFill>
+                  <a:schemeClr val="accent1"/>
                 </a:solidFill>
               </a:rPr>
               <a:t>Bots:</a:t>
             </a:r>
             <a:r>
-              <a:rPr lang="en-US" altLang="en-US" sz="3000"/>
+              <a:rPr lang="en-US" altLang="en-US" sz="3000" dirty="0"/>
               <a:t> Autonomous programs performing tasks</a:t>
             </a:r>
           </a:p>
@@ -23126,7 +22944,7 @@
               </a:lnSpc>
             </a:pPr>
             <a:r>
-              <a:rPr lang="en-US" altLang="en-US" sz="3000"/>
+              <a:rPr lang="en-US" altLang="en-US" sz="3000" dirty="0"/>
               <a:t>Plenty of </a:t>
             </a:r>
             <a:r>
@@ -23134,7 +22952,7 @@
               <a:t>“</a:t>
             </a:r>
             <a:r>
-              <a:rPr lang="en-US" altLang="ja-JP" sz="3000"/>
+              <a:rPr lang="en-US" altLang="ja-JP" sz="3000" dirty="0"/>
               <a:t>benign</a:t>
             </a:r>
             <a:r>
@@ -23142,7 +22960,7 @@
               <a:t>”</a:t>
             </a:r>
             <a:r>
-              <a:rPr lang="en-US" altLang="ja-JP" sz="3000"/>
+              <a:rPr lang="en-US" altLang="ja-JP" sz="3000" dirty="0"/>
               <a:t> bots</a:t>
             </a:r>
           </a:p>
@@ -23153,17 +22971,17 @@
               </a:lnSpc>
             </a:pPr>
             <a:r>
-              <a:rPr lang="en-US" altLang="en-US" sz="2600" i="1"/>
+              <a:rPr lang="en-US" altLang="en-US" sz="2600" i="1" dirty="0"/>
               <a:t>e.g., </a:t>
             </a:r>
             <a:r>
-              <a:rPr lang="en-US" altLang="en-US" sz="2600"/>
+              <a:rPr lang="en-US" altLang="en-US" sz="2600" dirty="0" err="1"/>
               <a:t>weatherbug</a:t>
             </a:r>
             <a:br>
-              <a:rPr lang="en-US" altLang="en-US" sz="2600"/>
+              <a:rPr lang="en-US" altLang="en-US" sz="2600" dirty="0"/>
             </a:br>
-            <a:endParaRPr lang="en-US" altLang="en-US" sz="2600" i="1"/>
+            <a:endParaRPr lang="en-US" altLang="en-US" sz="2600" i="1" dirty="0"/>
           </a:p>
           <a:p>
             <a:pPr>
@@ -23172,19 +22990,15 @@
               </a:lnSpc>
             </a:pPr>
             <a:r>
-              <a:rPr lang="en-US" altLang="en-US" sz="3000" b="1">
-                <a:solidFill>
-                  <a:srgbClr val="FF3300"/>
+              <a:rPr lang="en-US" altLang="en-US" sz="3000" b="1" dirty="0">
+                <a:solidFill>
+                  <a:schemeClr val="accent1"/>
                 </a:solidFill>
               </a:rPr>
-              <a:t>Botnets:</a:t>
-            </a:r>
-            <a:r>
-              <a:rPr lang="en-US" altLang="en-US" sz="3000" b="1"/>
-              <a:t> </a:t>
-            </a:r>
-            <a:r>
-              <a:rPr lang="en-US" altLang="en-US" sz="3000"/>
+              <a:t>Botnets: </a:t>
+            </a:r>
+            <a:r>
+              <a:rPr lang="en-US" altLang="en-US" sz="3000" dirty="0"/>
               <a:t>group of bots </a:t>
             </a:r>
           </a:p>
@@ -23195,7 +23009,7 @@
               </a:lnSpc>
             </a:pPr>
             <a:r>
-              <a:rPr lang="en-US" altLang="en-US" sz="2600"/>
+              <a:rPr lang="en-US" altLang="en-US" sz="2600" dirty="0"/>
               <a:t>Typically carries malicious connotation</a:t>
             </a:r>
           </a:p>
@@ -23206,7 +23020,7 @@
               </a:lnSpc>
             </a:pPr>
             <a:r>
-              <a:rPr lang="en-US" altLang="en-US" sz="2600"/>
+              <a:rPr lang="en-US" altLang="en-US" sz="2600" dirty="0"/>
               <a:t>Large numbers of infected machines</a:t>
             </a:r>
           </a:p>
@@ -23217,7 +23031,7 @@
               </a:lnSpc>
             </a:pPr>
             <a:r>
-              <a:rPr lang="en-US" altLang="en-US" sz="2600"/>
+              <a:rPr lang="en-US" altLang="en-US" sz="2600" dirty="0"/>
               <a:t>Machines </a:t>
             </a:r>
             <a:r>
@@ -23225,7 +23039,7 @@
               <a:t>“</a:t>
             </a:r>
             <a:r>
-              <a:rPr lang="en-US" altLang="ja-JP" sz="2600"/>
+              <a:rPr lang="en-US" altLang="ja-JP" sz="2600" dirty="0"/>
               <a:t>enlisted</a:t>
             </a:r>
             <a:r>
@@ -23233,13 +23047,13 @@
               <a:t>”</a:t>
             </a:r>
             <a:r>
-              <a:rPr lang="en-US" altLang="ja-JP" sz="2600"/>
+              <a:rPr lang="en-US" altLang="ja-JP" sz="2600" dirty="0"/>
               <a:t> with infection vectors like worms (last lecture)</a:t>
             </a:r>
             <a:br>
-              <a:rPr lang="en-US" altLang="ja-JP" sz="2600"/>
+              <a:rPr lang="en-US" altLang="ja-JP" sz="2600" dirty="0"/>
             </a:br>
-            <a:endParaRPr lang="en-US" altLang="ja-JP" sz="2600"/>
+            <a:endParaRPr lang="en-US" altLang="ja-JP" sz="2600" dirty="0"/>
           </a:p>
           <a:p>
             <a:pPr>
@@ -23248,20 +23062,28 @@
               </a:lnSpc>
             </a:pPr>
             <a:r>
-              <a:rPr lang="en-US" altLang="en-US" sz="3000"/>
+              <a:rPr lang="en-US" altLang="en-US" sz="3000" dirty="0"/>
               <a:t>Available for </a:t>
             </a:r>
             <a:r>
-              <a:rPr lang="en-US" altLang="en-US" sz="3000" b="1">
-                <a:solidFill>
-                  <a:srgbClr val="FF3300"/>
+              <a:rPr lang="en-US" altLang="en-US" sz="3000" b="1" dirty="0">
+                <a:solidFill>
+                  <a:schemeClr val="accent1"/>
                 </a:solidFill>
               </a:rPr>
               <a:t>simultaneous control</a:t>
             </a:r>
             <a:r>
-              <a:rPr lang="en-US" altLang="en-US" sz="3000"/>
-              <a:t> by a master</a:t>
+              <a:rPr lang="en-US" altLang="en-US" sz="3000" dirty="0">
+                <a:solidFill>
+                  <a:schemeClr val="accent1"/>
+                </a:solidFill>
+              </a:rPr>
+              <a:t> </a:t>
+            </a:r>
+            <a:r>
+              <a:rPr lang="en-US" altLang="en-US" sz="3000" dirty="0"/>
+              <a:t>by a master</a:t>
             </a:r>
           </a:p>
         </p:txBody>
@@ -23712,7 +23534,7 @@
         </p:nvSpPr>
         <p:spPr>
           <a:xfrm>
-            <a:off x="1981200" y="1600200"/>
+            <a:off x="1199423" y="1418716"/>
             <a:ext cx="8686800" cy="4876800"/>
           </a:xfrm>
         </p:spPr>
@@ -23723,51 +23545,91 @@
           <a:lstStyle/>
           <a:p>
             <a:r>
-              <a:rPr lang="en-US" altLang="en-US" sz="2400"/>
+              <a:rPr lang="en-US" altLang="en-US" sz="2400" dirty="0"/>
               <a:t>Network Intrusion Detection Systems (</a:t>
             </a:r>
             <a:r>
-              <a:rPr lang="en-US" altLang="en-US" sz="2400" i="1"/>
+              <a:rPr lang="en-US" altLang="en-US" sz="2400" i="1" dirty="0"/>
               <a:t>e.g.,</a:t>
             </a:r>
             <a:r>
-              <a:rPr lang="en-US" altLang="en-US" sz="2400"/>
+              <a:rPr lang="en-US" altLang="en-US" sz="2400" dirty="0"/>
               <a:t> Snort)</a:t>
             </a:r>
           </a:p>
           <a:p>
             <a:pPr lvl="1"/>
             <a:r>
-              <a:rPr lang="en-US" altLang="en-US" sz="2000" b="1">
-                <a:solidFill>
-                  <a:srgbClr val="FF3300"/>
+              <a:rPr lang="en-US" altLang="en-US" sz="2000" b="1" dirty="0">
+                <a:solidFill>
+                  <a:schemeClr val="accent1"/>
                 </a:solidFill>
               </a:rPr>
               <a:t>Signature:</a:t>
             </a:r>
             <a:r>
-              <a:rPr lang="en-US" altLang="en-US" sz="2000"/>
-              <a:t> alert tcp any any -&gt; any any (msg:"Agobot/Phatbot Infection Successful"; flow:established; content:"221 </a:t>
+              <a:rPr lang="en-US" altLang="en-US" sz="2000" dirty="0"/>
+              <a:t> alert </a:t>
+            </a:r>
+            <a:r>
+              <a:rPr lang="en-US" altLang="en-US" sz="2000" dirty="0" err="1"/>
+              <a:t>tcp</a:t>
+            </a:r>
+            <a:r>
+              <a:rPr lang="en-US" altLang="en-US" sz="2000" dirty="0"/>
+              <a:t> any any -&gt; any any (msg:"</a:t>
+            </a:r>
+            <a:r>
+              <a:rPr lang="en-US" altLang="en-US" sz="2000" dirty="0" err="1"/>
+              <a:t>Agobot</a:t>
+            </a:r>
+            <a:r>
+              <a:rPr lang="en-US" altLang="en-US" sz="2000" dirty="0"/>
+              <a:t>/</a:t>
+            </a:r>
+            <a:r>
+              <a:rPr lang="en-US" altLang="en-US" sz="2000" dirty="0" err="1"/>
+              <a:t>Phatbot</a:t>
+            </a:r>
+            <a:r>
+              <a:rPr lang="en-US" altLang="en-US" sz="2000" dirty="0"/>
+              <a:t> Infection Successful"; </a:t>
+            </a:r>
+            <a:r>
+              <a:rPr lang="en-US" altLang="en-US" sz="2000" dirty="0" err="1"/>
+              <a:t>flow:established</a:t>
+            </a:r>
+            <a:r>
+              <a:rPr lang="en-US" altLang="en-US" sz="2000" dirty="0"/>
+              <a:t>; content:"221 </a:t>
             </a:r>
           </a:p>
           <a:p>
             <a:pPr lvl="1"/>
-            <a:endParaRPr lang="en-US" altLang="en-US" sz="2000"/>
-          </a:p>
-          <a:p>
-            <a:r>
-              <a:rPr lang="en-US" altLang="en-US" sz="2400" b="1">
-                <a:solidFill>
-                  <a:srgbClr val="FF3300"/>
+            <a:endParaRPr lang="en-US" altLang="en-US" sz="2000" dirty="0"/>
+          </a:p>
+          <a:p>
+            <a:r>
+              <a:rPr lang="en-US" altLang="en-US" sz="2400" b="1" dirty="0" err="1">
+                <a:solidFill>
+                  <a:schemeClr val="accent1"/>
                 </a:solidFill>
               </a:rPr>
-              <a:t>Honetpots/Honeynets: </a:t>
-            </a:r>
-            <a:r>
-              <a:rPr lang="en-US" altLang="en-US" sz="2400"/>
+              <a:t>Honetpots</a:t>
+            </a:r>
+            <a:r>
+              <a:rPr lang="en-US" altLang="en-US" sz="2400" b="1" dirty="0">
+                <a:solidFill>
+                  <a:schemeClr val="accent1"/>
+                </a:solidFill>
+              </a:rPr>
+              <a:t>/Honeynets: </a:t>
+            </a:r>
+            <a:r>
+              <a:rPr lang="en-US" altLang="en-US" sz="2400" dirty="0"/>
               <a:t>gather information</a:t>
             </a:r>
-            <a:endParaRPr lang="en-US" altLang="en-US" sz="2400" b="1">
+            <a:endParaRPr lang="en-US" altLang="en-US" sz="2400" b="1" dirty="0">
               <a:solidFill>
                 <a:srgbClr val="FF3300"/>
               </a:solidFill>
@@ -23776,46 +23638,42 @@
           <a:p>
             <a:pPr lvl="1"/>
             <a:r>
-              <a:rPr lang="en-US" altLang="en-US" sz="2000"/>
+              <a:rPr lang="en-US" altLang="en-US" sz="2000" dirty="0"/>
               <a:t>Run unpatched version of Windows</a:t>
             </a:r>
           </a:p>
           <a:p>
             <a:pPr lvl="1"/>
             <a:r>
-              <a:rPr lang="en-US" altLang="en-US" sz="2000"/>
+              <a:rPr lang="en-US" altLang="en-US" sz="2000" dirty="0"/>
               <a:t>Usually infected within 10 minutes</a:t>
             </a:r>
           </a:p>
           <a:p>
             <a:pPr lvl="1"/>
             <a:r>
-              <a:rPr lang="en-US" altLang="en-US" sz="2000" b="1">
-                <a:solidFill>
-                  <a:srgbClr val="FF3300"/>
+              <a:rPr lang="en-US" altLang="en-US" sz="2000" b="1" dirty="0">
+                <a:solidFill>
+                  <a:schemeClr val="accent1"/>
                 </a:solidFill>
               </a:rPr>
-              <a:t>Capture binary</a:t>
-            </a:r>
-            <a:r>
-              <a:rPr lang="en-US" altLang="en-US" sz="2000" b="1"/>
-              <a:t> </a:t>
+              <a:t>Capture binary </a:t>
             </a:r>
           </a:p>
           <a:p>
             <a:pPr lvl="2"/>
             <a:r>
-              <a:rPr lang="en-US" altLang="en-US"/>
+              <a:rPr lang="en-US" altLang="en-US" dirty="0"/>
               <a:t>determine scanning patterns, etc.</a:t>
             </a:r>
-            <a:endParaRPr lang="en-US" altLang="en-US" b="1"/>
+            <a:endParaRPr lang="en-US" altLang="en-US" b="1" dirty="0"/>
           </a:p>
           <a:p>
             <a:pPr lvl="1"/>
             <a:r>
-              <a:rPr lang="en-US" altLang="en-US" sz="2000" b="1">
-                <a:solidFill>
-                  <a:srgbClr val="FF3300"/>
+              <a:rPr lang="en-US" altLang="en-US" sz="2000" b="1" dirty="0">
+                <a:solidFill>
+                  <a:schemeClr val="accent1"/>
                 </a:solidFill>
               </a:rPr>
               <a:t>Capture network traffic</a:t>
@@ -23824,13 +23682,13 @@
           <a:p>
             <a:pPr lvl="2"/>
             <a:r>
-              <a:rPr lang="en-US" altLang="en-US"/>
+              <a:rPr lang="en-US" altLang="en-US" dirty="0"/>
               <a:t>Locate identity of command and control, other bots, etc.</a:t>
             </a:r>
           </a:p>
           <a:p>
             <a:pPr lvl="2"/>
-            <a:endParaRPr lang="en-US" altLang="en-US" sz="1600" b="1">
+            <a:endParaRPr lang="en-US" altLang="en-US" sz="1600" b="1" dirty="0">
               <a:solidFill>
                 <a:srgbClr val="FF0000"/>
               </a:solidFill>
@@ -23838,9 +23696,9 @@
           </a:p>
           <a:p>
             <a:r>
-              <a:rPr lang="en-US" altLang="en-US" sz="2400" b="1">
-                <a:solidFill>
-                  <a:srgbClr val="FF0000"/>
+              <a:rPr lang="en-US" altLang="en-US" sz="2400" b="1" dirty="0">
+                <a:solidFill>
+                  <a:schemeClr val="accent1"/>
                 </a:solidFill>
               </a:rPr>
               <a:t>“Internet Motion Sensor”</a:t>
@@ -23848,7 +23706,7 @@
           </a:p>
           <a:p>
             <a:pPr lvl="1"/>
-            <a:endParaRPr lang="en-US" altLang="en-US" sz="2000"/>
+            <a:endParaRPr lang="en-US" altLang="en-US" sz="2000" dirty="0"/>
           </a:p>
         </p:txBody>
       </p:sp>
@@ -24834,7 +24692,12 @@
             <p:ph idx="1"/>
           </p:nvPr>
         </p:nvSpPr>
-        <p:spPr/>
+        <p:spPr>
+          <a:xfrm>
+            <a:off x="838200" y="1543657"/>
+            <a:ext cx="3799436" cy="4157428"/>
+          </a:xfrm>
+        </p:spPr>
         <p:txBody>
           <a:bodyPr/>
           <a:lstStyle/>
@@ -24845,7 +24708,9 @@
             </a:r>
           </a:p>
           <a:p>
-            <a:pPr lvl="1"/>
+            <a:endParaRPr lang="en-US" dirty="0"/>
+          </a:p>
+          <a:p>
             <a:r>
               <a:rPr lang="en-US" dirty="0"/>
               <a:t>Querying /24 subnets aggregated every day</a:t>
@@ -24874,7 +24739,7 @@
         </p:blipFill>
         <p:spPr bwMode="auto">
           <a:xfrm>
-            <a:off x="7531100" y="1790700"/>
+            <a:off x="9618166" y="2195549"/>
             <a:ext cx="749300" cy="749300"/>
           </a:xfrm>
           <a:prstGeom prst="rect">
@@ -24891,7 +24756,7 @@
         </p:nvSpPr>
         <p:spPr>
           <a:xfrm>
-            <a:off x="3838575" y="3048000"/>
+            <a:off x="5925641" y="3452849"/>
             <a:ext cx="762000" cy="457200"/>
           </a:xfrm>
           <a:prstGeom prst="can">
@@ -24945,7 +24810,7 @@
         </p:nvGrpSpPr>
         <p:grpSpPr>
           <a:xfrm>
-            <a:off x="5435600" y="3771900"/>
+            <a:off x="7522666" y="4176749"/>
             <a:ext cx="1428750" cy="857250"/>
             <a:chOff x="6273798" y="2271492"/>
             <a:chExt cx="1428750" cy="857250"/>
@@ -25151,7 +25016,7 @@
         </p:nvGrpSpPr>
         <p:grpSpPr>
           <a:xfrm>
-            <a:off x="7315200" y="3771900"/>
+            <a:off x="9402266" y="4176749"/>
             <a:ext cx="1428750" cy="857250"/>
             <a:chOff x="6273798" y="1284516"/>
             <a:chExt cx="1428750" cy="857250"/>
@@ -25357,7 +25222,7 @@
         </p:nvGrpSpPr>
         <p:grpSpPr>
           <a:xfrm>
-            <a:off x="3505200" y="3771900"/>
+            <a:off x="5592266" y="4176749"/>
             <a:ext cx="1428750" cy="857250"/>
             <a:chOff x="6273798" y="3235788"/>
             <a:chExt cx="1428750" cy="857250"/>
@@ -25563,7 +25428,7 @@
         </p:nvSpPr>
         <p:spPr>
           <a:xfrm>
-            <a:off x="7648575" y="3048000"/>
+            <a:off x="9735641" y="3452849"/>
             <a:ext cx="762000" cy="457200"/>
           </a:xfrm>
           <a:prstGeom prst="can">
@@ -25617,7 +25482,7 @@
         </p:nvSpPr>
         <p:spPr>
           <a:xfrm>
-            <a:off x="5768975" y="3048000"/>
+            <a:off x="7856041" y="3452849"/>
             <a:ext cx="762000" cy="457200"/>
           </a:xfrm>
           <a:prstGeom prst="can">
@@ -25671,7 +25536,7 @@
         </p:nvSpPr>
         <p:spPr>
           <a:xfrm>
-            <a:off x="7289800" y="1308100"/>
+            <a:off x="9376866" y="1712949"/>
             <a:ext cx="1638300" cy="553998"/>
           </a:xfrm>
           <a:prstGeom prst="rect">
@@ -25706,7 +25571,7 @@
         </p:nvSpPr>
         <p:spPr>
           <a:xfrm>
-            <a:off x="4724400" y="1244601"/>
+            <a:off x="6811466" y="1649450"/>
             <a:ext cx="1747594" cy="323165"/>
           </a:xfrm>
           <a:prstGeom prst="rect">
@@ -25744,7 +25609,7 @@
         </p:blipFill>
         <p:spPr bwMode="auto">
           <a:xfrm>
-            <a:off x="5054600" y="1524000"/>
+            <a:off x="7141666" y="1928849"/>
             <a:ext cx="749300" cy="749300"/>
           </a:xfrm>
           <a:prstGeom prst="rect">
@@ -25761,7 +25626,7 @@
         </p:nvGrpSpPr>
         <p:grpSpPr>
           <a:xfrm>
-            <a:off x="4203701" y="2146300"/>
+            <a:off x="6290767" y="2551149"/>
             <a:ext cx="3813175" cy="901700"/>
             <a:chOff x="2679700" y="2146300"/>
             <a:chExt cx="3813175" cy="901700"/>
@@ -25884,7 +25749,7 @@
         </p:nvCxnSpPr>
         <p:spPr>
           <a:xfrm>
-            <a:off x="4219575" y="3543300"/>
+            <a:off x="6306641" y="3948149"/>
             <a:ext cx="0" cy="228600"/>
           </a:xfrm>
           <a:prstGeom prst="straightConnector1">
@@ -25921,7 +25786,7 @@
         </p:nvSpPr>
         <p:spPr>
           <a:xfrm>
-            <a:off x="3256704" y="1635498"/>
+            <a:off x="5343770" y="2040347"/>
             <a:ext cx="1841063" cy="646331"/>
           </a:xfrm>
           <a:prstGeom prst="rect">
@@ -25936,11 +25801,10 @@
           <a:lstStyle/>
           <a:p>
             <a:r>
-              <a:rPr lang="en-US" dirty="0">
-                <a:solidFill>
-                  <a:srgbClr val="FF0000"/>
-                </a:solidFill>
-                <a:latin typeface="MV Boli" pitchFamily="2" charset="0"/>
+              <a:rPr lang="en-US" b="1" dirty="0">
+                <a:solidFill>
+                  <a:schemeClr val="accent1"/>
+                </a:solidFill>
                 <a:cs typeface="MV Boli" pitchFamily="2" charset="0"/>
               </a:rPr>
               <a:t>Collection point</a:t>
@@ -25956,7 +25820,7 @@
         </p:nvGrpSpPr>
         <p:grpSpPr>
           <a:xfrm>
-            <a:off x="4419600" y="2349500"/>
+            <a:off x="6506666" y="2754349"/>
             <a:ext cx="3733800" cy="698500"/>
             <a:chOff x="2895600" y="2349500"/>
             <a:chExt cx="3733800" cy="698500"/>
@@ -26084,7 +25948,7 @@
         </p:nvCxnSpPr>
         <p:spPr>
           <a:xfrm>
-            <a:off x="6149975" y="3543300"/>
+            <a:off x="8237041" y="3948149"/>
             <a:ext cx="0" cy="228600"/>
           </a:xfrm>
           <a:prstGeom prst="straightConnector1">
@@ -26121,7 +25985,7 @@
         </p:nvCxnSpPr>
         <p:spPr>
           <a:xfrm>
-            <a:off x="8029575" y="3543300"/>
+            <a:off x="10116641" y="3948149"/>
             <a:ext cx="0" cy="228600"/>
           </a:xfrm>
           <a:prstGeom prst="straightConnector1">
@@ -26158,7 +26022,7 @@
         </p:nvSpPr>
         <p:spPr>
           <a:xfrm>
-            <a:off x="2772360" y="5733905"/>
+            <a:off x="5982098" y="5317859"/>
             <a:ext cx="4385368" cy="338554"/>
           </a:xfrm>
           <a:prstGeom prst="rect">
@@ -26201,7 +26065,7 @@
         </p:nvSpPr>
         <p:spPr>
           <a:xfrm>
-            <a:off x="2527939" y="4020828"/>
+            <a:off x="4615005" y="4425677"/>
             <a:ext cx="960329" cy="553998"/>
           </a:xfrm>
           <a:prstGeom prst="rect">
@@ -26507,15 +26371,7 @@
           <a:p>
             <a:r>
               <a:rPr lang="en-US" dirty="0"/>
-              <a:t>2</a:t>
-            </a:r>
-            <a:r>
-              <a:rPr lang="en-US" baseline="30000" dirty="0"/>
-              <a:t>nd</a:t>
-            </a:r>
-            <a:r>
-              <a:rPr lang="en-US" dirty="0"/>
-              <a:t> challenge: How to make decision quickly?</a:t>
+              <a:t>How to Make Decisions Quickly?</a:t>
             </a:r>
           </a:p>
         </p:txBody>
@@ -26536,41 +26392,37 @@
           <a:lstStyle/>
           <a:p>
             <a:r>
-              <a:rPr lang="en-US" dirty="0">
-                <a:solidFill>
-                  <a:srgbClr val="000000"/>
-                </a:solidFill>
-              </a:rPr>
-              <a:t>Large scale of data</a:t>
-            </a:r>
-          </a:p>
-          <a:p>
-            <a:pPr lvl="1"/>
-            <a:r>
               <a:rPr lang="en-US" dirty="0"/>
               <a:t>Email service</a:t>
             </a:r>
           </a:p>
           <a:p>
-            <a:pPr lvl="2"/>
+            <a:pPr lvl="1"/>
+            <a:r>
+              <a:rPr lang="en-US" dirty="0"/>
+              <a:t>Thousands of email addresses in an enterprise-like network</a:t>
+            </a:r>
+          </a:p>
+          <a:p>
+            <a:pPr lvl="1"/>
+            <a:r>
+              <a:rPr lang="en-US" dirty="0"/>
+              <a:t>About 150 billion emails worldwide per day </a:t>
+            </a:r>
             <a:r>
               <a:rPr lang="en-US" sz="2000" dirty="0"/>
-              <a:t>Thousands of email addresses in an enterprise-like network</a:t>
-            </a:r>
-          </a:p>
-          <a:p>
-            <a:pPr lvl="2"/>
-            <a:r>
-              <a:rPr lang="en-US" sz="2000" dirty="0"/>
-              <a:t>About 150 billion emails worldwide per day </a:t>
-            </a:r>
-            <a:r>
-              <a:rPr lang="en-US" sz="1600" dirty="0"/>
-              <a:t>(source: Internet live stats)</a:t>
-            </a:r>
-          </a:p>
-          <a:p>
-            <a:pPr lvl="1"/>
+              <a:t>(source: Internet live </a:t>
+            </a:r>
+            <a:r>
+              <a:rPr lang="en-US" sz="2000"/>
+              <a:t>stats)</a:t>
+            </a:r>
+            <a:br>
+              <a:rPr lang="en-US" sz="2000"/>
+            </a:br>
+            <a:endParaRPr lang="en-US" sz="2000" dirty="0"/>
+          </a:p>
+          <a:p>
             <a:r>
               <a:rPr lang="en-US" dirty="0"/>
               <a:t>DNS </a:t>
@@ -26582,26 +26434,17 @@
             <a:endParaRPr lang="en-US" dirty="0"/>
           </a:p>
           <a:p>
-            <a:pPr lvl="2"/>
-            <a:r>
-              <a:rPr lang="en-US" sz="2000" dirty="0"/>
-              <a:t>Billions of DNS queries at top-level </a:t>
-            </a:r>
-            <a:r>
-              <a:rPr lang="en-US" sz="2000" dirty="0" err="1"/>
-              <a:t>nameservers</a:t>
-            </a:r>
-            <a:r>
-              <a:rPr lang="en-US" sz="2000" dirty="0"/>
-              <a:t> per day</a:t>
-            </a:r>
-          </a:p>
-          <a:p>
-            <a:pPr lvl="2"/>
+            <a:pPr lvl="1"/>
+            <a:r>
+              <a:rPr lang="en-US" dirty="0"/>
+              <a:t>Billions of DNS queries at top-level nameservers per day</a:t>
+            </a:r>
+            <a:br>
+              <a:rPr lang="en-US" dirty="0"/>
+            </a:br>
             <a:endParaRPr lang="en-US" sz="2000" dirty="0"/>
           </a:p>
           <a:p>
-            <a:pPr lvl="1"/>
             <a:r>
               <a:rPr lang="en-US" dirty="0"/>
               <a:t>Registries and registrars</a:t>
@@ -26662,7 +26505,7 @@
                                         <p:tgtEl>
                                           <p:spTgt spid="2">
                                             <p:txEl>
-                                              <p:pRg st="2" end="2"/>
+                                              <p:pRg st="1" end="1"/>
                                             </p:txEl>
                                           </p:spTgt>
                                         </p:tgtEl>
@@ -26693,7 +26536,7 @@
                                         <p:tgtEl>
                                           <p:spTgt spid="2">
                                             <p:txEl>
-                                              <p:pRg st="3" end="3"/>
+                                              <p:pRg st="2" end="2"/>
                                             </p:txEl>
                                           </p:spTgt>
                                         </p:tgtEl>
@@ -26742,7 +26585,7 @@
                                         <p:tgtEl>
                                           <p:spTgt spid="2">
                                             <p:txEl>
-                                              <p:pRg st="5" end="5"/>
+                                              <p:pRg st="4" end="4"/>
                                             </p:txEl>
                                           </p:spTgt>
                                         </p:tgtEl>
@@ -26791,7 +26634,7 @@
                                         <p:tgtEl>
                                           <p:spTgt spid="2">
                                             <p:txEl>
-                                              <p:pRg st="8" end="8"/>
+                                              <p:pRg st="6" end="6"/>
                                             </p:txEl>
                                           </p:spTgt>
                                         </p:tgtEl>
@@ -26974,7 +26817,7 @@
           <a:p>
             <a:r>
               <a:rPr lang="en-US" dirty="0"/>
-              <a:t>Learn about botnets</a:t>
+              <a:t>Learn about network attacks (e.g., botnets, spam, phishing)</a:t>
             </a:r>
           </a:p>
           <a:p>
@@ -27176,7 +27019,7 @@
           <a:p>
             <a:r>
               <a:rPr lang="en-US" dirty="0"/>
-              <a:t>Spam-related activity</a:t>
+              <a:t>Spam-Related Activity</a:t>
             </a:r>
           </a:p>
         </p:txBody>
@@ -28761,7 +28604,12 @@
             <p:ph type="title"/>
           </p:nvPr>
         </p:nvSpPr>
-        <p:spPr/>
+        <p:spPr>
+          <a:xfrm>
+            <a:off x="838198" y="0"/>
+            <a:ext cx="11091673" cy="1325563"/>
+          </a:xfrm>
+        </p:spPr>
         <p:txBody>
           <a:bodyPr>
             <a:normAutofit/>
@@ -28770,15 +28618,7 @@
           <a:p>
             <a:r>
               <a:rPr lang="en-US" dirty="0"/>
-              <a:t>1</a:t>
-            </a:r>
-            <a:r>
-              <a:rPr lang="en-US" baseline="30000" dirty="0"/>
-              <a:t>st</a:t>
-            </a:r>
-            <a:r>
-              <a:rPr lang="en-US" dirty="0"/>
-              <a:t> challenge: How to find useful features?</a:t>
+              <a:t>How to Find Useful Features? Look at Invariants</a:t>
             </a:r>
           </a:p>
         </p:txBody>
@@ -28800,67 +28640,51 @@
           <a:p>
             <a:r>
               <a:rPr lang="en-US" dirty="0"/>
-              <a:t>Attack agility</a:t>
+              <a:t>Sending agility</a:t>
             </a:r>
           </a:p>
           <a:p>
             <a:pPr lvl="1"/>
             <a:r>
               <a:rPr lang="en-US" dirty="0"/>
-              <a:t>Sending agility</a:t>
-            </a:r>
-          </a:p>
-          <a:p>
-            <a:pPr lvl="2"/>
+              <a:t>Botnets to acquire IP dynamics</a:t>
+            </a:r>
+          </a:p>
+          <a:p>
+            <a:pPr lvl="1"/>
+            <a:r>
+              <a:rPr lang="en-US" dirty="0"/>
+              <a:t>750K spam emails found from hacked fridges and TVs </a:t>
+            </a:r>
             <a:r>
               <a:rPr lang="en-US" sz="2000" dirty="0"/>
-              <a:t>Botnets to acquire IP dynamics</a:t>
-            </a:r>
-          </a:p>
-          <a:p>
-            <a:pPr lvl="2"/>
-            <a:r>
-              <a:rPr lang="en-US" sz="2000" dirty="0"/>
-              <a:t>750K spam emails found from hacked fridges and TVs</a:t>
-            </a:r>
-            <a:r>
-              <a:rPr lang="en-US" dirty="0"/>
-              <a:t> </a:t>
-            </a:r>
-            <a:r>
-              <a:rPr lang="en-US" sz="1600" dirty="0"/>
               <a:t>(reported Jan 2014)</a:t>
             </a:r>
           </a:p>
           <a:p>
-            <a:pPr lvl="1"/>
             <a:r>
               <a:rPr lang="en-US" dirty="0"/>
               <a:t>Hosting agility</a:t>
             </a:r>
           </a:p>
           <a:p>
-            <a:pPr lvl="2"/>
-            <a:r>
-              <a:rPr lang="en-US" sz="2000" dirty="0"/>
+            <a:pPr lvl="1"/>
+            <a:r>
+              <a:rPr lang="en-US" dirty="0"/>
               <a:t>Embedded URLs to direct to spam-advertised sites</a:t>
             </a:r>
-          </a:p>
-          <a:p>
-            <a:pPr lvl="2"/>
             <a:endParaRPr lang="en-US" sz="2000" dirty="0"/>
           </a:p>
           <a:p>
-            <a:pPr lvl="1"/>
             <a:r>
               <a:rPr lang="en-US" dirty="0"/>
               <a:t>Naming agility</a:t>
             </a:r>
           </a:p>
           <a:p>
-            <a:pPr lvl="2"/>
-            <a:r>
-              <a:rPr lang="en-US" sz="2000" dirty="0"/>
+            <a:pPr lvl="1"/>
+            <a:r>
+              <a:rPr lang="en-US" dirty="0"/>
               <a:t>New domains registered to evade blacklisting</a:t>
             </a:r>
           </a:p>
@@ -28912,7 +28736,7 @@
                                         <p:tgtEl>
                                           <p:spTgt spid="2">
                                             <p:txEl>
-                                              <p:pRg st="2" end="2"/>
+                                              <p:pRg st="1" end="1"/>
                                             </p:txEl>
                                           </p:spTgt>
                                         </p:tgtEl>
@@ -28943,7 +28767,7 @@
                                         <p:tgtEl>
                                           <p:spTgt spid="2">
                                             <p:txEl>
-                                              <p:pRg st="3" end="3"/>
+                                              <p:pRg st="2" end="2"/>
                                             </p:txEl>
                                           </p:spTgt>
                                         </p:tgtEl>
@@ -28992,7 +28816,7 @@
                                         <p:tgtEl>
                                           <p:spTgt spid="2">
                                             <p:txEl>
-                                              <p:pRg st="5" end="5"/>
+                                              <p:pRg st="4" end="4"/>
                                             </p:txEl>
                                           </p:spTgt>
                                         </p:tgtEl>
@@ -29041,7 +28865,7 @@
                                         <p:tgtEl>
                                           <p:spTgt spid="2">
                                             <p:txEl>
-                                              <p:pRg st="8" end="8"/>
+                                              <p:pRg st="6" end="6"/>
                                             </p:txEl>
                                           </p:spTgt>
                                         </p:tgtEl>
@@ -29796,29 +29620,7 @@
           <a:p>
             <a:r>
               <a:rPr lang="en-US" dirty="0"/>
-              <a:t>Distribution of geodesic distance</a:t>
-            </a:r>
-          </a:p>
-        </p:txBody>
-      </p:sp>
-      <p:sp>
-        <p:nvSpPr>
-          <p:cNvPr id="3" name="Text Placeholder 2"/>
-          <p:cNvSpPr>
-            <a:spLocks noGrp="1"/>
-          </p:cNvSpPr>
-          <p:nvPr>
-            <p:ph idx="1"/>
-          </p:nvPr>
-        </p:nvSpPr>
-        <p:spPr/>
-        <p:txBody>
-          <a:bodyPr/>
-          <a:lstStyle/>
-          <a:p>
-            <a:r>
-              <a:rPr lang="en-US" dirty="0"/>
-              <a:t>SNARE</a:t>
+              <a:t>Distribution of Geodesic Distance</a:t>
             </a:r>
           </a:p>
         </p:txBody>
@@ -29933,8 +29735,8 @@
         </p:nvSpPr>
         <p:spPr bwMode="auto">
           <a:xfrm>
-            <a:off x="1922465" y="6064237"/>
-            <a:ext cx="7814203" cy="505897"/>
+            <a:off x="564929" y="3052737"/>
+            <a:ext cx="2647663" cy="1153503"/>
           </a:xfrm>
           <a:prstGeom prst="rect">
             <a:avLst/>
@@ -30020,8 +29822,8 @@
         </p:nvSpPr>
         <p:spPr>
           <a:xfrm>
-            <a:off x="1862860" y="1303339"/>
-            <a:ext cx="8347075" cy="897995"/>
+            <a:off x="201168" y="1554427"/>
+            <a:ext cx="3882287" cy="897995"/>
           </a:xfrm>
           <a:prstGeom prst="rect">
             <a:avLst/>
@@ -30029,7 +29831,7 @@
         </p:spPr>
         <p:txBody>
           <a:bodyPr vert="horz" lIns="91440" tIns="45720" rIns="91440" bIns="45720" rtlCol="0">
-            <a:normAutofit/>
+            <a:normAutofit fontScale="92500" lnSpcReduction="10000"/>
           </a:bodyPr>
           <a:lstStyle>
             <a:lvl1pPr marL="342900" indent="-342900" algn="l" defTabSz="457200" rtl="0" eaLnBrk="1" latinLnBrk="0" hangingPunct="1">
@@ -30420,12 +30222,12 @@
           <a:lstStyle/>
           <a:p>
             <a:r>
-              <a:rPr lang="en-US" dirty="0">
-                <a:solidFill>
-                  <a:srgbClr val="000090"/>
+              <a:rPr lang="en-US" b="1" dirty="0">
+                <a:solidFill>
+                  <a:schemeClr val="accent1"/>
                 </a:solidFill>
               </a:rPr>
-              <a:t>Single-packet</a:t>
+              <a:t>Single-Packet</a:t>
             </a:r>
           </a:p>
           <a:p>
@@ -30481,12 +30283,12 @@
           </a:p>
           <a:p>
             <a:r>
-              <a:rPr lang="en-US" dirty="0">
-                <a:solidFill>
-                  <a:srgbClr val="000090"/>
+              <a:rPr lang="en-US" b="1" dirty="0">
+                <a:solidFill>
+                  <a:schemeClr val="accent1"/>
                 </a:solidFill>
               </a:rPr>
-              <a:t>Single-header/message</a:t>
+              <a:t>Single-header/Message</a:t>
             </a:r>
           </a:p>
           <a:p>
@@ -30508,74 +30310,12 @@
           </a:p>
           <a:p>
             <a:r>
-              <a:rPr lang="en-US" dirty="0">
-                <a:solidFill>
-                  <a:srgbClr val="000090"/>
+              <a:rPr lang="en-US" b="1" dirty="0">
+                <a:solidFill>
+                  <a:schemeClr val="accent1"/>
                 </a:solidFill>
               </a:rPr>
               <a:t>Aggregate</a:t>
-            </a:r>
-            <a:endParaRPr lang="en-US" dirty="0"/>
-          </a:p>
-        </p:txBody>
-      </p:sp>
-      <p:sp>
-        <p:nvSpPr>
-          <p:cNvPr id="3" name="Text Placeholder 2"/>
-          <p:cNvSpPr>
-            <a:spLocks noGrp="1"/>
-          </p:cNvSpPr>
-          <p:nvPr>
-            <p:ph type="body" sz="quarter" idx="4294967295"/>
-          </p:nvPr>
-        </p:nvSpPr>
-        <p:spPr>
-          <a:xfrm>
-            <a:off x="0" y="19050"/>
-            <a:ext cx="2286000" cy="393700"/>
-          </a:xfrm>
-        </p:spPr>
-        <p:txBody>
-          <a:bodyPr>
-            <a:normAutofit fontScale="85000" lnSpcReduction="20000"/>
-          </a:bodyPr>
-          <a:lstStyle/>
-          <a:p>
-            <a:r>
-              <a:rPr lang="en-US" dirty="0"/>
-              <a:t>SNARE</a:t>
-            </a:r>
-          </a:p>
-        </p:txBody>
-      </p:sp>
-      <p:sp>
-        <p:nvSpPr>
-          <p:cNvPr id="6" name="TextBox 5"/>
-          <p:cNvSpPr txBox="1"/>
-          <p:nvPr/>
-        </p:nvSpPr>
-        <p:spPr>
-          <a:xfrm>
-            <a:off x="3918949" y="5691613"/>
-            <a:ext cx="3712650" cy="430887"/>
-          </a:xfrm>
-          <a:prstGeom prst="rect">
-            <a:avLst/>
-          </a:prstGeom>
-          <a:noFill/>
-        </p:spPr>
-        <p:txBody>
-          <a:bodyPr wrap="none" rtlCol="0">
-            <a:spAutoFit/>
-          </a:bodyPr>
-          <a:lstStyle/>
-          <a:p>
-            <a:r>
-              <a:rPr lang="en-US" sz="2200" dirty="0">
-                <a:latin typeface="Arial"/>
-                <a:cs typeface="Arial"/>
-              </a:rPr>
-              <a:t>(multiple message/recipient)</a:t>
             </a:r>
           </a:p>
         </p:txBody>
@@ -30851,51 +30591,6 @@
                       </p:childTnLst>
                     </p:cTn>
                   </p:par>
-                  <p:par>
-                    <p:cTn id="21" fill="hold">
-                      <p:stCondLst>
-                        <p:cond delay="indefinite"/>
-                      </p:stCondLst>
-                      <p:childTnLst>
-                        <p:par>
-                          <p:cTn id="22" fill="hold">
-                            <p:stCondLst>
-                              <p:cond delay="0"/>
-                            </p:stCondLst>
-                            <p:childTnLst>
-                              <p:par>
-                                <p:cTn id="23" presetID="1" presetClass="entr" presetSubtype="0" fill="hold" grpId="0" nodeType="clickEffect">
-                                  <p:stCondLst>
-                                    <p:cond delay="0"/>
-                                  </p:stCondLst>
-                                  <p:childTnLst>
-                                    <p:set>
-                                      <p:cBhvr>
-                                        <p:cTn id="24" dur="1" fill="hold">
-                                          <p:stCondLst>
-                                            <p:cond delay="0"/>
-                                          </p:stCondLst>
-                                        </p:cTn>
-                                        <p:tgtEl>
-                                          <p:spTgt spid="6"/>
-                                        </p:tgtEl>
-                                        <p:attrNameLst>
-                                          <p:attrName>style.visibility</p:attrName>
-                                        </p:attrNameLst>
-                                      </p:cBhvr>
-                                      <p:to>
-                                        <p:strVal val="visible"/>
-                                      </p:to>
-                                    </p:set>
-                                  </p:childTnLst>
-                                </p:cTn>
-                              </p:par>
-                            </p:childTnLst>
-                          </p:cTn>
-                        </p:par>
-                      </p:childTnLst>
-                    </p:cTn>
-                  </p:par>
                 </p:childTnLst>
               </p:cTn>
               <p:prevCondLst>
@@ -30917,9 +30612,6 @@
         </p:cTn>
       </p:par>
     </p:tnLst>
-    <p:bldLst>
-      <p:bldP spid="6" grpId="0"/>
-    </p:bldLst>
   </p:timing>
 </p:sld>
 </file>

</xml_diff>